<commit_message>
Finish Unit 5 and start 6
</commit_message>
<xml_diff>
--- a/Unit05/Chad_Madding_Unit 5 For Live Session.pptx
+++ b/Unit05/Chad_Madding_Unit 5 For Live Session.pptx
@@ -215,7 +215,7 @@
           <a:p>
             <a:fld id="{F91415B4-81E4-4AC4-90AB-397CCE382C1C}" type="datetimeFigureOut">
               <a:rPr lang="en-US" smtClean="0"/>
-              <a:t>1/31/2020</a:t>
+              <a:t>2/4/2020</a:t>
             </a:fld>
             <a:endParaRPr lang="en-US"/>
           </a:p>
@@ -627,7 +627,7 @@
           <a:p>
             <a:fld id="{1D8BD707-D9CF-40AE-B4C6-C98DA3205C09}" type="datetimeFigureOut">
               <a:rPr lang="en-US"/>
-              <a:t>1/31/2020</a:t>
+              <a:t>2/4/2020</a:t>
             </a:fld>
             <a:endParaRPr lang="en-US"/>
           </a:p>
@@ -804,7 +804,7 @@
           <a:p>
             <a:fld id="{1D8BD707-D9CF-40AE-B4C6-C98DA3205C09}" type="datetimeFigureOut">
               <a:rPr lang="en-US"/>
-              <a:t>1/31/2020</a:t>
+              <a:t>2/4/2020</a:t>
             </a:fld>
             <a:endParaRPr lang="en-US"/>
           </a:p>
@@ -1018,7 +1018,7 @@
           <a:p>
             <a:fld id="{1D8BD707-D9CF-40AE-B4C6-C98DA3205C09}" type="datetimeFigureOut">
               <a:rPr lang="en-US"/>
-              <a:t>1/31/2020</a:t>
+              <a:t>2/4/2020</a:t>
             </a:fld>
             <a:endParaRPr lang="en-US"/>
           </a:p>
@@ -1166,7 +1166,7 @@
           <a:p>
             <a:fld id="{1D8BD707-D9CF-40AE-B4C6-C98DA3205C09}" type="datetimeFigureOut">
               <a:rPr lang="en-US"/>
-              <a:t>1/31/2020</a:t>
+              <a:t>2/4/2020</a:t>
             </a:fld>
             <a:endParaRPr lang="en-US"/>
           </a:p>
@@ -1285,7 +1285,7 @@
           <a:p>
             <a:fld id="{1D8BD707-D9CF-40AE-B4C6-C98DA3205C09}" type="datetimeFigureOut">
               <a:rPr lang="en-US"/>
-              <a:t>1/31/2020</a:t>
+              <a:t>2/4/2020</a:t>
             </a:fld>
             <a:endParaRPr lang="en-US"/>
           </a:p>
@@ -1602,7 +1602,7 @@
           <a:p>
             <a:fld id="{1D8BD707-D9CF-40AE-B4C6-C98DA3205C09}" type="datetimeFigureOut">
               <a:rPr lang="en-US"/>
-              <a:t>1/31/2020</a:t>
+              <a:t>2/4/2020</a:t>
             </a:fld>
             <a:endParaRPr lang="en-US"/>
           </a:p>
@@ -2268,27 +2268,14 @@
           <a:p>
             <a:r>
               <a:rPr lang="en-US" dirty="0"/>
-              <a:t>Five Smallest Values of  </a:t>
-            </a:r>
-            <a:r>
-              <a:rPr lang="en-US" dirty="0" err="1"/>
-              <a:t>aic</a:t>
-            </a:r>
+              <a:t>Five Smallest Values of  aic </a:t>
+            </a:r>
+          </a:p>
+          <a:p>
             <a:r>
               <a:rPr lang="en-US" dirty="0"/>
-              <a:t> </a:t>
-            </a:r>
-          </a:p>
-          <a:p>
-            <a:r>
-              <a:rPr lang="en-US" dirty="0"/>
-              <a:t>        p    q        </a:t>
-            </a:r>
-            <a:r>
-              <a:rPr lang="en-US" dirty="0" err="1"/>
-              <a:t>aic</a:t>
-            </a:r>
-            <a:endParaRPr lang="en-US" dirty="0"/>
+              <a:t>        p    q        aic</a:t>
+            </a:r>
           </a:p>
           <a:p>
             <a:r>
@@ -2455,145 +2442,243 @@
           </a:p>
         </p:txBody>
       </p:sp>
-      <p:sp>
-        <p:nvSpPr>
-          <p:cNvPr id="13" name="Title 1">
-            <a:extLst>
-              <a:ext uri="{FF2B5EF4-FFF2-40B4-BE49-F238E27FC236}">
-                <a16:creationId xmlns:a16="http://schemas.microsoft.com/office/drawing/2014/main" id="{BF2BC9D2-51F1-4CCD-A042-717A35E94CDF}"/>
-              </a:ext>
-            </a:extLst>
-          </p:cNvPr>
-          <p:cNvSpPr>
-            <a:spLocks noGrp="1"/>
-          </p:cNvSpPr>
-          <p:nvPr>
-            <p:ph type="title"/>
-          </p:nvPr>
-        </p:nvSpPr>
-        <p:spPr>
-          <a:xfrm>
-            <a:off x="565435" y="454223"/>
-            <a:ext cx="8013129" cy="615553"/>
-          </a:xfrm>
-        </p:spPr>
-        <p:txBody>
-          <a:bodyPr/>
-          <a:lstStyle/>
-          <a:p>
-            <a:pPr algn="ctr"/>
-            <a:r>
-              <a:rPr lang="en-US" sz="2000" dirty="0"/>
-              <a:t>Find ρ1 for the following model by hand.</a:t>
-            </a:r>
-            <a:br>
-              <a:rPr lang="en-US" sz="2000" dirty="0"/>
-            </a:br>
-            <a:r>
-              <a:rPr lang="en-US" sz="2000" dirty="0" err="1"/>
-              <a:t>Xt</a:t>
-            </a:r>
-            <a:r>
-              <a:rPr lang="en-US" sz="2000" dirty="0"/>
-              <a:t> = at–.8at-1 + .5at–2.</a:t>
-            </a:r>
-          </a:p>
-        </p:txBody>
-      </p:sp>
-      <p:pic>
-        <p:nvPicPr>
-          <p:cNvPr id="2" name="Picture 1">
-            <a:extLst>
-              <a:ext uri="{FF2B5EF4-FFF2-40B4-BE49-F238E27FC236}">
-                <a16:creationId xmlns:a16="http://schemas.microsoft.com/office/drawing/2014/main" id="{051BF068-A559-4E15-8711-DB8814BA4AD3}"/>
-              </a:ext>
-            </a:extLst>
-          </p:cNvPr>
-          <p:cNvPicPr>
-            <a:picLocks noChangeAspect="1"/>
-          </p:cNvPicPr>
-          <p:nvPr/>
-        </p:nvPicPr>
-        <p:blipFill>
-          <a:blip r:embed="rId3"/>
-          <a:stretch>
-            <a:fillRect/>
-          </a:stretch>
-        </p:blipFill>
-        <p:spPr>
-          <a:xfrm>
-            <a:off x="1273937" y="1066800"/>
-            <a:ext cx="1469263" cy="902286"/>
-          </a:xfrm>
-          <a:prstGeom prst="rect">
-            <a:avLst/>
-          </a:prstGeom>
-        </p:spPr>
-      </p:pic>
-      <p:pic>
-        <p:nvPicPr>
-          <p:cNvPr id="4" name="Picture 3">
-            <a:extLst>
-              <a:ext uri="{FF2B5EF4-FFF2-40B4-BE49-F238E27FC236}">
-                <a16:creationId xmlns:a16="http://schemas.microsoft.com/office/drawing/2014/main" id="{64C8688F-B600-4C5F-B12C-FC71F7F61B88}"/>
-              </a:ext>
-            </a:extLst>
-          </p:cNvPr>
-          <p:cNvPicPr>
-            <a:picLocks noChangeAspect="1"/>
-          </p:cNvPicPr>
-          <p:nvPr/>
-        </p:nvPicPr>
-        <p:blipFill>
-          <a:blip r:embed="rId4"/>
-          <a:stretch>
-            <a:fillRect/>
-          </a:stretch>
-        </p:blipFill>
-        <p:spPr>
-          <a:xfrm>
-            <a:off x="3753281" y="1244254"/>
-            <a:ext cx="4628719" cy="562467"/>
-          </a:xfrm>
-          <a:prstGeom prst="rect">
-            <a:avLst/>
-          </a:prstGeom>
-        </p:spPr>
-      </p:pic>
-      <p:sp>
-        <p:nvSpPr>
-          <p:cNvPr id="6" name="Rectangle 5">
-            <a:extLst>
-              <a:ext uri="{FF2B5EF4-FFF2-40B4-BE49-F238E27FC236}">
-                <a16:creationId xmlns:a16="http://schemas.microsoft.com/office/drawing/2014/main" id="{567DFA56-58EC-42D4-84CE-E4F1A1C43CE7}"/>
-              </a:ext>
-            </a:extLst>
-          </p:cNvPr>
-          <p:cNvSpPr/>
-          <p:nvPr/>
-        </p:nvSpPr>
-        <p:spPr>
-          <a:xfrm>
-            <a:off x="685800" y="5370493"/>
-            <a:ext cx="8013129" cy="954107"/>
-          </a:xfrm>
-          <a:prstGeom prst="rect">
-            <a:avLst/>
-          </a:prstGeom>
-        </p:spPr>
-        <p:txBody>
-          <a:bodyPr wrap="square">
-            <a:spAutoFit/>
-          </a:bodyPr>
-          <a:lstStyle/>
-          <a:p>
-            <a:r>
-              <a:rPr lang="en-US" sz="2800" dirty="0"/>
-              <a:t>Looking at the above Autocorrelation we can truly see that p1 is -.5333. </a:t>
-            </a:r>
-          </a:p>
-        </p:txBody>
-      </p:sp>
+      <mc:AlternateContent xmlns:mc="http://schemas.openxmlformats.org/markup-compatibility/2006" xmlns:a14="http://schemas.microsoft.com/office/drawing/2010/main">
+        <mc:Choice Requires="a14">
+          <p:sp>
+            <p:nvSpPr>
+              <p:cNvPr id="13" name="Title 1">
+                <a:extLst>
+                  <a:ext uri="{FF2B5EF4-FFF2-40B4-BE49-F238E27FC236}">
+                    <a16:creationId xmlns:a16="http://schemas.microsoft.com/office/drawing/2014/main" id="{BF2BC9D2-51F1-4CCD-A042-717A35E94CDF}"/>
+                  </a:ext>
+                </a:extLst>
+              </p:cNvPr>
+              <p:cNvSpPr>
+                <a:spLocks noGrp="1"/>
+              </p:cNvSpPr>
+              <p:nvPr>
+                <p:ph type="title"/>
+              </p:nvPr>
+            </p:nvSpPr>
+            <p:spPr>
+              <a:xfrm>
+                <a:off x="565435" y="454223"/>
+                <a:ext cx="8013129" cy="307777"/>
+              </a:xfrm>
+            </p:spPr>
+            <p:txBody>
+              <a:bodyPr/>
+              <a:lstStyle/>
+              <a:p>
+                <a:pPr algn="ctr"/>
+                <a:r>
+                  <a:rPr lang="en-US" sz="2000" dirty="0"/>
+                  <a:t>Find </a:t>
+                </a:r>
+                <a14:m>
+                  <m:oMath xmlns:m="http://schemas.openxmlformats.org/officeDocument/2006/math">
+                    <m:sSub>
+                      <m:sSubPr>
+                        <m:ctrlPr>
+                          <a:rPr lang="en-US" sz="2000" i="1">
+                            <a:latin typeface="Cambria Math" panose="02040503050406030204" pitchFamily="18" charset="0"/>
+                            <a:cs typeface="Arial" panose="020B0604020202020204" pitchFamily="34" charset="0"/>
+                          </a:rPr>
+                        </m:ctrlPr>
+                      </m:sSubPr>
+                      <m:e>
+                        <m:r>
+                          <a:rPr lang="en-US" sz="2000" i="1">
+                            <a:latin typeface="Cambria Math" panose="02040503050406030204" pitchFamily="18" charset="0"/>
+                            <a:ea typeface="Cambria Math" panose="02040503050406030204" pitchFamily="18" charset="0"/>
+                            <a:cs typeface="Arial" panose="020B0604020202020204" pitchFamily="34" charset="0"/>
+                          </a:rPr>
+                          <m:t>𝜌</m:t>
+                        </m:r>
+                      </m:e>
+                      <m:sub>
+                        <m:r>
+                          <a:rPr lang="en-US" sz="2000" i="1">
+                            <a:latin typeface="Cambria Math" panose="02040503050406030204" pitchFamily="18" charset="0"/>
+                            <a:cs typeface="Arial" panose="020B0604020202020204" pitchFamily="34" charset="0"/>
+                          </a:rPr>
+                          <m:t>1</m:t>
+                        </m:r>
+                      </m:sub>
+                    </m:sSub>
+                  </m:oMath>
+                </a14:m>
+                <a:r>
+                  <a:rPr lang="en-US" sz="2000" dirty="0"/>
+                  <a:t> for the following model by hand.</a:t>
+                </a:r>
+              </a:p>
+            </p:txBody>
+          </p:sp>
+        </mc:Choice>
+        <mc:Fallback xmlns="">
+          <p:sp>
+            <p:nvSpPr>
+              <p:cNvPr id="13" name="Title 1">
+                <a:extLst>
+                  <a:ext uri="{FF2B5EF4-FFF2-40B4-BE49-F238E27FC236}">
+                    <a16:creationId xmlns:a16="http://schemas.microsoft.com/office/drawing/2014/main" id="{BF2BC9D2-51F1-4CCD-A042-717A35E94CDF}"/>
+                  </a:ext>
+                </a:extLst>
+              </p:cNvPr>
+              <p:cNvSpPr>
+                <a:spLocks noGrp="1" noRot="1" noChangeAspect="1" noMove="1" noResize="1" noEditPoints="1" noAdjustHandles="1" noChangeArrowheads="1" noChangeShapeType="1" noTextEdit="1"/>
+              </p:cNvSpPr>
+              <p:nvPr>
+                <p:ph type="title"/>
+              </p:nvPr>
+            </p:nvSpPr>
+            <p:spPr>
+              <a:xfrm>
+                <a:off x="565435" y="454223"/>
+                <a:ext cx="8013129" cy="307777"/>
+              </a:xfrm>
+              <a:blipFill>
+                <a:blip r:embed="rId3"/>
+                <a:stretch>
+                  <a:fillRect t="-24000" b="-52000"/>
+                </a:stretch>
+              </a:blipFill>
+            </p:spPr>
+            <p:txBody>
+              <a:bodyPr/>
+              <a:lstStyle/>
+              <a:p>
+                <a:r>
+                  <a:rPr lang="en-US">
+                    <a:noFill/>
+                  </a:rPr>
+                  <a:t> </a:t>
+                </a:r>
+              </a:p>
+            </p:txBody>
+          </p:sp>
+        </mc:Fallback>
+      </mc:AlternateContent>
+      <mc:AlternateContent xmlns:mc="http://schemas.openxmlformats.org/markup-compatibility/2006" xmlns:a14="http://schemas.microsoft.com/office/drawing/2010/main">
+        <mc:Choice Requires="a14">
+          <p:sp>
+            <p:nvSpPr>
+              <p:cNvPr id="6" name="Rectangle 5">
+                <a:extLst>
+                  <a:ext uri="{FF2B5EF4-FFF2-40B4-BE49-F238E27FC236}">
+                    <a16:creationId xmlns:a16="http://schemas.microsoft.com/office/drawing/2014/main" id="{567DFA56-58EC-42D4-84CE-E4F1A1C43CE7}"/>
+                  </a:ext>
+                </a:extLst>
+              </p:cNvPr>
+              <p:cNvSpPr/>
+              <p:nvPr/>
+            </p:nvSpPr>
+            <p:spPr>
+              <a:xfrm>
+                <a:off x="685800" y="5370493"/>
+                <a:ext cx="8013129" cy="954107"/>
+              </a:xfrm>
+              <a:prstGeom prst="rect">
+                <a:avLst/>
+              </a:prstGeom>
+            </p:spPr>
+            <p:txBody>
+              <a:bodyPr wrap="square">
+                <a:spAutoFit/>
+              </a:bodyPr>
+              <a:lstStyle/>
+              <a:p>
+                <a:r>
+                  <a:rPr lang="en-US" sz="2800" dirty="0"/>
+                  <a:t>Looking at the above Autocorrelation we can truly see that </a:t>
+                </a:r>
+                <a14:m>
+                  <m:oMath xmlns:m="http://schemas.openxmlformats.org/officeDocument/2006/math">
+                    <m:sSub>
+                      <m:sSubPr>
+                        <m:ctrlPr>
+                          <a:rPr lang="en-US" sz="2800" i="1">
+                            <a:latin typeface="Cambria Math" panose="02040503050406030204" pitchFamily="18" charset="0"/>
+                            <a:cs typeface="Arial" panose="020B0604020202020204" pitchFamily="34" charset="0"/>
+                          </a:rPr>
+                        </m:ctrlPr>
+                      </m:sSubPr>
+                      <m:e>
+                        <m:r>
+                          <a:rPr lang="en-US" sz="2800" i="1">
+                            <a:latin typeface="Cambria Math" panose="02040503050406030204" pitchFamily="18" charset="0"/>
+                            <a:ea typeface="Cambria Math" panose="02040503050406030204" pitchFamily="18" charset="0"/>
+                            <a:cs typeface="Arial" panose="020B0604020202020204" pitchFamily="34" charset="0"/>
+                          </a:rPr>
+                          <m:t>𝜌</m:t>
+                        </m:r>
+                      </m:e>
+                      <m:sub>
+                        <m:r>
+                          <a:rPr lang="en-US" sz="2800" i="1">
+                            <a:latin typeface="Cambria Math" panose="02040503050406030204" pitchFamily="18" charset="0"/>
+                            <a:cs typeface="Arial" panose="020B0604020202020204" pitchFamily="34" charset="0"/>
+                          </a:rPr>
+                          <m:t>1</m:t>
+                        </m:r>
+                      </m:sub>
+                    </m:sSub>
+                  </m:oMath>
+                </a14:m>
+                <a:r>
+                  <a:rPr lang="en-US" sz="2800" dirty="0"/>
+                  <a:t> is -.6349206. </a:t>
+                </a:r>
+              </a:p>
+            </p:txBody>
+          </p:sp>
+        </mc:Choice>
+        <mc:Fallback xmlns="">
+          <p:sp>
+            <p:nvSpPr>
+              <p:cNvPr id="6" name="Rectangle 5">
+                <a:extLst>
+                  <a:ext uri="{FF2B5EF4-FFF2-40B4-BE49-F238E27FC236}">
+                    <a16:creationId xmlns:a16="http://schemas.microsoft.com/office/drawing/2014/main" id="{567DFA56-58EC-42D4-84CE-E4F1A1C43CE7}"/>
+                  </a:ext>
+                </a:extLst>
+              </p:cNvPr>
+              <p:cNvSpPr>
+                <a:spLocks noRot="1" noChangeAspect="1" noMove="1" noResize="1" noEditPoints="1" noAdjustHandles="1" noChangeArrowheads="1" noChangeShapeType="1" noTextEdit="1"/>
+              </p:cNvSpPr>
+              <p:nvPr/>
+            </p:nvSpPr>
+            <p:spPr>
+              <a:xfrm>
+                <a:off x="685800" y="5370493"/>
+                <a:ext cx="8013129" cy="954107"/>
+              </a:xfrm>
+              <a:prstGeom prst="rect">
+                <a:avLst/>
+              </a:prstGeom>
+              <a:blipFill>
+                <a:blip r:embed="rId4"/>
+                <a:stretch>
+                  <a:fillRect l="-1598" t="-6369" r="-1979" b="-17197"/>
+                </a:stretch>
+              </a:blipFill>
+            </p:spPr>
+            <p:txBody>
+              <a:bodyPr/>
+              <a:lstStyle/>
+              <a:p>
+                <a:r>
+                  <a:rPr lang="en-US">
+                    <a:noFill/>
+                  </a:rPr>
+                  <a:t> </a:t>
+                </a:r>
+              </a:p>
+            </p:txBody>
+          </p:sp>
+        </mc:Fallback>
+      </mc:AlternateContent>
       <p:pic>
         <p:nvPicPr>
           <p:cNvPr id="5" name="Picture 4">
@@ -2616,20 +2701,550 @@
         </p:blipFill>
         <p:spPr>
           <a:xfrm>
-            <a:off x="2133256" y="2885723"/>
-            <a:ext cx="4877481" cy="2524477"/>
+            <a:off x="1828800" y="2134335"/>
+            <a:ext cx="6329222" cy="3275866"/>
           </a:xfrm>
           <a:prstGeom prst="rect">
             <a:avLst/>
           </a:prstGeom>
         </p:spPr>
       </p:pic>
+      <p:pic>
+        <p:nvPicPr>
+          <p:cNvPr id="7" name="Picture 6">
+            <a:extLst>
+              <a:ext uri="{FF2B5EF4-FFF2-40B4-BE49-F238E27FC236}">
+                <a16:creationId xmlns:a16="http://schemas.microsoft.com/office/drawing/2014/main" id="{377C923F-D4F9-4427-9E8E-2DA02F39B797}"/>
+              </a:ext>
+            </a:extLst>
+          </p:cNvPr>
+          <p:cNvPicPr>
+            <a:picLocks noChangeAspect="1"/>
+          </p:cNvPicPr>
+          <p:nvPr/>
+        </p:nvPicPr>
+        <p:blipFill>
+          <a:blip r:embed="rId6"/>
+          <a:stretch>
+            <a:fillRect/>
+          </a:stretch>
+        </p:blipFill>
+        <p:spPr>
+          <a:xfrm>
+            <a:off x="376200" y="990600"/>
+            <a:ext cx="2443200" cy="1029600"/>
+          </a:xfrm>
+          <a:prstGeom prst="rect">
+            <a:avLst/>
+          </a:prstGeom>
+        </p:spPr>
+      </p:pic>
+      <mc:AlternateContent xmlns:mc="http://schemas.openxmlformats.org/markup-compatibility/2006" xmlns:a14="http://schemas.microsoft.com/office/drawing/2010/main">
+        <mc:Choice Requires="a14">
+          <p:sp>
+            <p:nvSpPr>
+              <p:cNvPr id="11" name="Rectangle 10">
+                <a:extLst>
+                  <a:ext uri="{FF2B5EF4-FFF2-40B4-BE49-F238E27FC236}">
+                    <a16:creationId xmlns:a16="http://schemas.microsoft.com/office/drawing/2014/main" id="{9ADAD16E-25E1-4032-9385-BC709874F050}"/>
+                  </a:ext>
+                </a:extLst>
+              </p:cNvPr>
+              <p:cNvSpPr/>
+              <p:nvPr/>
+            </p:nvSpPr>
+            <p:spPr>
+              <a:xfrm>
+                <a:off x="2883464" y="1371600"/>
+                <a:ext cx="6184336" cy="686535"/>
+              </a:xfrm>
+              <a:prstGeom prst="rect">
+                <a:avLst/>
+              </a:prstGeom>
+            </p:spPr>
+            <p:txBody>
+              <a:bodyPr wrap="square">
+                <a:spAutoFit/>
+              </a:bodyPr>
+              <a:lstStyle/>
+              <a:p>
+                <a:pPr/>
+                <a14:m>
+                  <m:oMathPara xmlns:m="http://schemas.openxmlformats.org/officeDocument/2006/math">
+                    <m:oMathParaPr>
+                      <m:jc m:val="centerGroup"/>
+                    </m:oMathParaPr>
+                    <m:oMath xmlns:m="http://schemas.openxmlformats.org/officeDocument/2006/math">
+                      <m:sSub>
+                        <m:sSubPr>
+                          <m:ctrlPr>
+                            <a:rPr lang="en-US" i="1" smtClean="0">
+                              <a:latin typeface="Cambria Math" panose="02040503050406030204" pitchFamily="18" charset="0"/>
+                              <a:cs typeface="Arial" panose="020B0604020202020204" pitchFamily="34" charset="0"/>
+                            </a:rPr>
+                          </m:ctrlPr>
+                        </m:sSubPr>
+                        <m:e>
+                          <m:r>
+                            <a:rPr lang="en-US" i="1">
+                              <a:latin typeface="Cambria Math" panose="02040503050406030204" pitchFamily="18" charset="0"/>
+                              <a:ea typeface="Cambria Math" panose="02040503050406030204" pitchFamily="18" charset="0"/>
+                              <a:cs typeface="Arial" panose="020B0604020202020204" pitchFamily="34" charset="0"/>
+                            </a:rPr>
+                            <m:t>𝜌</m:t>
+                          </m:r>
+                        </m:e>
+                        <m:sub>
+                          <m:r>
+                            <a:rPr lang="en-US" i="1">
+                              <a:latin typeface="Cambria Math" panose="02040503050406030204" pitchFamily="18" charset="0"/>
+                              <a:cs typeface="Arial" panose="020B0604020202020204" pitchFamily="34" charset="0"/>
+                            </a:rPr>
+                            <m:t>1</m:t>
+                          </m:r>
+                        </m:sub>
+                      </m:sSub>
+                      <m:r>
+                        <a:rPr lang="en-US" i="1">
+                          <a:latin typeface="Cambria Math" panose="02040503050406030204" pitchFamily="18" charset="0"/>
+                          <a:cs typeface="Arial" panose="020B0604020202020204" pitchFamily="34" charset="0"/>
+                        </a:rPr>
+                        <m:t>=</m:t>
+                      </m:r>
+                      <m:f>
+                        <m:fPr>
+                          <m:ctrlPr>
+                            <a:rPr lang="en-US" i="1">
+                              <a:latin typeface="Cambria Math" panose="02040503050406030204" pitchFamily="18" charset="0"/>
+                              <a:cs typeface="Arial" panose="020B0604020202020204" pitchFamily="34" charset="0"/>
+                            </a:rPr>
+                          </m:ctrlPr>
+                        </m:fPr>
+                        <m:num>
+                          <m:r>
+                            <a:rPr lang="en-US" i="1">
+                              <a:latin typeface="Cambria Math" panose="02040503050406030204" pitchFamily="18" charset="0"/>
+                              <a:cs typeface="Arial" panose="020B0604020202020204" pitchFamily="34" charset="0"/>
+                            </a:rPr>
+                            <m:t>−</m:t>
+                          </m:r>
+                          <m:sSub>
+                            <m:sSubPr>
+                              <m:ctrlPr>
+                                <a:rPr lang="en-US" i="1">
+                                  <a:latin typeface="Cambria Math" panose="02040503050406030204" pitchFamily="18" charset="0"/>
+                                  <a:cs typeface="Arial" panose="020B0604020202020204" pitchFamily="34" charset="0"/>
+                                </a:rPr>
+                              </m:ctrlPr>
+                            </m:sSubPr>
+                            <m:e>
+                              <m:r>
+                                <a:rPr lang="en-US" i="1">
+                                  <a:latin typeface="Cambria Math" panose="02040503050406030204" pitchFamily="18" charset="0"/>
+                                  <a:ea typeface="Cambria Math" panose="02040503050406030204" pitchFamily="18" charset="0"/>
+                                  <a:cs typeface="Arial" panose="020B0604020202020204" pitchFamily="34" charset="0"/>
+                                </a:rPr>
+                                <m:t>𝜃</m:t>
+                              </m:r>
+                            </m:e>
+                            <m:sub>
+                              <m:r>
+                                <a:rPr lang="en-US" i="1">
+                                  <a:latin typeface="Cambria Math" panose="02040503050406030204" pitchFamily="18" charset="0"/>
+                                  <a:cs typeface="Arial" panose="020B0604020202020204" pitchFamily="34" charset="0"/>
+                                </a:rPr>
+                                <m:t>1</m:t>
+                              </m:r>
+                            </m:sub>
+                          </m:sSub>
+                          <m:r>
+                            <a:rPr lang="en-US" i="1">
+                              <a:latin typeface="Cambria Math" panose="02040503050406030204" pitchFamily="18" charset="0"/>
+                              <a:cs typeface="Arial" panose="020B0604020202020204" pitchFamily="34" charset="0"/>
+                            </a:rPr>
+                            <m:t>+</m:t>
+                          </m:r>
+                          <m:sSub>
+                            <m:sSubPr>
+                              <m:ctrlPr>
+                                <a:rPr lang="en-US" i="1">
+                                  <a:latin typeface="Cambria Math" panose="02040503050406030204" pitchFamily="18" charset="0"/>
+                                  <a:cs typeface="Arial" panose="020B0604020202020204" pitchFamily="34" charset="0"/>
+                                </a:rPr>
+                              </m:ctrlPr>
+                            </m:sSubPr>
+                            <m:e>
+                              <m:r>
+                                <a:rPr lang="en-US" i="1">
+                                  <a:latin typeface="Cambria Math" panose="02040503050406030204" pitchFamily="18" charset="0"/>
+                                  <a:ea typeface="Cambria Math" panose="02040503050406030204" pitchFamily="18" charset="0"/>
+                                  <a:cs typeface="Arial" panose="020B0604020202020204" pitchFamily="34" charset="0"/>
+                                </a:rPr>
+                                <m:t>𝜃</m:t>
+                              </m:r>
+                            </m:e>
+                            <m:sub>
+                              <m:r>
+                                <a:rPr lang="en-US" i="1">
+                                  <a:latin typeface="Cambria Math" panose="02040503050406030204" pitchFamily="18" charset="0"/>
+                                  <a:cs typeface="Arial" panose="020B0604020202020204" pitchFamily="34" charset="0"/>
+                                </a:rPr>
+                                <m:t>1</m:t>
+                              </m:r>
+                            </m:sub>
+                          </m:sSub>
+                          <m:sSub>
+                            <m:sSubPr>
+                              <m:ctrlPr>
+                                <a:rPr lang="en-US" i="1">
+                                  <a:latin typeface="Cambria Math" panose="02040503050406030204" pitchFamily="18" charset="0"/>
+                                  <a:cs typeface="Arial" panose="020B0604020202020204" pitchFamily="34" charset="0"/>
+                                </a:rPr>
+                              </m:ctrlPr>
+                            </m:sSubPr>
+                            <m:e>
+                              <m:r>
+                                <a:rPr lang="en-US" i="1">
+                                  <a:latin typeface="Cambria Math" panose="02040503050406030204" pitchFamily="18" charset="0"/>
+                                  <a:ea typeface="Cambria Math" panose="02040503050406030204" pitchFamily="18" charset="0"/>
+                                  <a:cs typeface="Arial" panose="020B0604020202020204" pitchFamily="34" charset="0"/>
+                                </a:rPr>
+                                <m:t>𝜃</m:t>
+                              </m:r>
+                            </m:e>
+                            <m:sub>
+                              <m:r>
+                                <a:rPr lang="en-US" i="1">
+                                  <a:latin typeface="Cambria Math" panose="02040503050406030204" pitchFamily="18" charset="0"/>
+                                  <a:ea typeface="Cambria Math" panose="02040503050406030204" pitchFamily="18" charset="0"/>
+                                  <a:cs typeface="Arial" panose="020B0604020202020204" pitchFamily="34" charset="0"/>
+                                </a:rPr>
+                                <m:t>2</m:t>
+                              </m:r>
+                            </m:sub>
+                          </m:sSub>
+                        </m:num>
+                        <m:den>
+                          <m:r>
+                            <a:rPr lang="en-US" i="1">
+                              <a:latin typeface="Cambria Math" panose="02040503050406030204" pitchFamily="18" charset="0"/>
+                              <a:cs typeface="Arial" panose="020B0604020202020204" pitchFamily="34" charset="0"/>
+                            </a:rPr>
+                            <m:t>1+</m:t>
+                          </m:r>
+                          <m:sSubSup>
+                            <m:sSubSupPr>
+                              <m:ctrlPr>
+                                <a:rPr lang="en-US" i="1">
+                                  <a:latin typeface="Cambria Math" panose="02040503050406030204" pitchFamily="18" charset="0"/>
+                                  <a:cs typeface="Arial" panose="020B0604020202020204" pitchFamily="34" charset="0"/>
+                                </a:rPr>
+                              </m:ctrlPr>
+                            </m:sSubSupPr>
+                            <m:e>
+                              <m:r>
+                                <a:rPr lang="en-US" i="1">
+                                  <a:latin typeface="Cambria Math" panose="02040503050406030204" pitchFamily="18" charset="0"/>
+                                  <a:ea typeface="Cambria Math" panose="02040503050406030204" pitchFamily="18" charset="0"/>
+                                  <a:cs typeface="Arial" panose="020B0604020202020204" pitchFamily="34" charset="0"/>
+                                </a:rPr>
+                                <m:t>𝜃</m:t>
+                              </m:r>
+                            </m:e>
+                            <m:sub>
+                              <m:r>
+                                <a:rPr lang="en-US" i="1">
+                                  <a:latin typeface="Cambria Math" panose="02040503050406030204" pitchFamily="18" charset="0"/>
+                                  <a:cs typeface="Arial" panose="020B0604020202020204" pitchFamily="34" charset="0"/>
+                                </a:rPr>
+                                <m:t>1</m:t>
+                              </m:r>
+                            </m:sub>
+                            <m:sup>
+                              <m:r>
+                                <a:rPr lang="en-US" i="1">
+                                  <a:latin typeface="Cambria Math" panose="02040503050406030204" pitchFamily="18" charset="0"/>
+                                  <a:cs typeface="Arial" panose="020B0604020202020204" pitchFamily="34" charset="0"/>
+                                </a:rPr>
+                                <m:t>2</m:t>
+                              </m:r>
+                            </m:sup>
+                          </m:sSubSup>
+                          <m:r>
+                            <a:rPr lang="en-US" i="1">
+                              <a:latin typeface="Cambria Math" panose="02040503050406030204" pitchFamily="18" charset="0"/>
+                              <a:cs typeface="Arial" panose="020B0604020202020204" pitchFamily="34" charset="0"/>
+                            </a:rPr>
+                            <m:t>+</m:t>
+                          </m:r>
+                          <m:sSubSup>
+                            <m:sSubSupPr>
+                              <m:ctrlPr>
+                                <a:rPr lang="en-US" i="1">
+                                  <a:latin typeface="Cambria Math" panose="02040503050406030204" pitchFamily="18" charset="0"/>
+                                  <a:cs typeface="Arial" panose="020B0604020202020204" pitchFamily="34" charset="0"/>
+                                </a:rPr>
+                              </m:ctrlPr>
+                            </m:sSubSupPr>
+                            <m:e>
+                              <m:r>
+                                <a:rPr lang="en-US" i="1">
+                                  <a:latin typeface="Cambria Math" panose="02040503050406030204" pitchFamily="18" charset="0"/>
+                                  <a:ea typeface="Cambria Math" panose="02040503050406030204" pitchFamily="18" charset="0"/>
+                                  <a:cs typeface="Arial" panose="020B0604020202020204" pitchFamily="34" charset="0"/>
+                                </a:rPr>
+                                <m:t>𝜃</m:t>
+                              </m:r>
+                            </m:e>
+                            <m:sub>
+                              <m:r>
+                                <a:rPr lang="en-US" i="1">
+                                  <a:latin typeface="Cambria Math" panose="02040503050406030204" pitchFamily="18" charset="0"/>
+                                  <a:ea typeface="Cambria Math" panose="02040503050406030204" pitchFamily="18" charset="0"/>
+                                  <a:cs typeface="Arial" panose="020B0604020202020204" pitchFamily="34" charset="0"/>
+                                </a:rPr>
+                                <m:t>2</m:t>
+                              </m:r>
+                            </m:sub>
+                            <m:sup>
+                              <m:r>
+                                <a:rPr lang="en-US" i="1">
+                                  <a:latin typeface="Cambria Math" panose="02040503050406030204" pitchFamily="18" charset="0"/>
+                                  <a:cs typeface="Arial" panose="020B0604020202020204" pitchFamily="34" charset="0"/>
+                                </a:rPr>
+                                <m:t>2</m:t>
+                              </m:r>
+                            </m:sup>
+                          </m:sSubSup>
+                        </m:den>
+                      </m:f>
+                      <m:r>
+                        <a:rPr lang="en-US">
+                          <a:latin typeface="Cambria Math" panose="02040503050406030204" pitchFamily="18" charset="0"/>
+                          <a:cs typeface="Arial" panose="020B0604020202020204" pitchFamily="34" charset="0"/>
+                        </a:rPr>
+                        <m:t>=</m:t>
+                      </m:r>
+                      <m:f>
+                        <m:fPr>
+                          <m:ctrlPr>
+                            <a:rPr lang="en-US" i="1">
+                              <a:latin typeface="Cambria Math" panose="02040503050406030204" pitchFamily="18" charset="0"/>
+                              <a:cs typeface="Arial" panose="020B0604020202020204" pitchFamily="34" charset="0"/>
+                            </a:rPr>
+                          </m:ctrlPr>
+                        </m:fPr>
+                        <m:num>
+                          <m:r>
+                            <a:rPr lang="en-US" i="1">
+                              <a:latin typeface="Cambria Math" panose="02040503050406030204" pitchFamily="18" charset="0"/>
+                              <a:cs typeface="Arial" panose="020B0604020202020204" pitchFamily="34" charset="0"/>
+                            </a:rPr>
+                            <m:t>−.</m:t>
+                          </m:r>
+                          <m:r>
+                            <a:rPr lang="en-US" b="0" i="1" smtClean="0">
+                              <a:latin typeface="Cambria Math" panose="02040503050406030204" pitchFamily="18" charset="0"/>
+                              <a:cs typeface="Arial" panose="020B0604020202020204" pitchFamily="34" charset="0"/>
+                            </a:rPr>
+                            <m:t>8</m:t>
+                          </m:r>
+                          <m:r>
+                            <a:rPr lang="en-US" i="1">
+                              <a:latin typeface="Cambria Math" panose="02040503050406030204" pitchFamily="18" charset="0"/>
+                              <a:cs typeface="Arial" panose="020B0604020202020204" pitchFamily="34" charset="0"/>
+                            </a:rPr>
+                            <m:t>+(.</m:t>
+                          </m:r>
+                          <m:r>
+                            <a:rPr lang="en-US" b="0" i="1" smtClean="0">
+                              <a:latin typeface="Cambria Math" panose="02040503050406030204" pitchFamily="18" charset="0"/>
+                              <a:cs typeface="Arial" panose="020B0604020202020204" pitchFamily="34" charset="0"/>
+                            </a:rPr>
+                            <m:t>8</m:t>
+                          </m:r>
+                          <m:r>
+                            <a:rPr lang="en-US" i="1">
+                              <a:latin typeface="Cambria Math" panose="02040503050406030204" pitchFamily="18" charset="0"/>
+                              <a:cs typeface="Arial" panose="020B0604020202020204" pitchFamily="34" charset="0"/>
+                            </a:rPr>
+                            <m:t>)(−.</m:t>
+                          </m:r>
+                          <m:r>
+                            <a:rPr lang="en-US" b="0" i="1" smtClean="0">
+                              <a:latin typeface="Cambria Math" panose="02040503050406030204" pitchFamily="18" charset="0"/>
+                              <a:cs typeface="Arial" panose="020B0604020202020204" pitchFamily="34" charset="0"/>
+                            </a:rPr>
+                            <m:t>5</m:t>
+                          </m:r>
+                          <m:r>
+                            <a:rPr lang="en-US" i="1">
+                              <a:latin typeface="Cambria Math" panose="02040503050406030204" pitchFamily="18" charset="0"/>
+                              <a:cs typeface="Arial" panose="020B0604020202020204" pitchFamily="34" charset="0"/>
+                            </a:rPr>
+                            <m:t>)</m:t>
+                          </m:r>
+                        </m:num>
+                        <m:den>
+                          <m:r>
+                            <a:rPr lang="en-US" i="1">
+                              <a:latin typeface="Cambria Math" panose="02040503050406030204" pitchFamily="18" charset="0"/>
+                              <a:cs typeface="Arial" panose="020B0604020202020204" pitchFamily="34" charset="0"/>
+                            </a:rPr>
+                            <m:t>1+</m:t>
+                          </m:r>
+                          <m:sSup>
+                            <m:sSupPr>
+                              <m:ctrlPr>
+                                <a:rPr lang="en-US" i="1">
+                                  <a:latin typeface="Cambria Math" panose="02040503050406030204" pitchFamily="18" charset="0"/>
+                                  <a:cs typeface="Arial" panose="020B0604020202020204" pitchFamily="34" charset="0"/>
+                                </a:rPr>
+                              </m:ctrlPr>
+                            </m:sSupPr>
+                            <m:e>
+                              <m:r>
+                                <a:rPr lang="en-US" i="1">
+                                  <a:latin typeface="Cambria Math" panose="02040503050406030204" pitchFamily="18" charset="0"/>
+                                  <a:cs typeface="Arial" panose="020B0604020202020204" pitchFamily="34" charset="0"/>
+                                </a:rPr>
+                                <m:t>.</m:t>
+                              </m:r>
+                              <m:r>
+                                <a:rPr lang="en-US" b="0" i="1" smtClean="0">
+                                  <a:latin typeface="Cambria Math" panose="02040503050406030204" pitchFamily="18" charset="0"/>
+                                  <a:cs typeface="Arial" panose="020B0604020202020204" pitchFamily="34" charset="0"/>
+                                </a:rPr>
+                                <m:t>8</m:t>
+                              </m:r>
+                            </m:e>
+                            <m:sup>
+                              <m:r>
+                                <a:rPr lang="en-US" i="1">
+                                  <a:latin typeface="Cambria Math" panose="02040503050406030204" pitchFamily="18" charset="0"/>
+                                  <a:cs typeface="Arial" panose="020B0604020202020204" pitchFamily="34" charset="0"/>
+                                </a:rPr>
+                                <m:t>2</m:t>
+                              </m:r>
+                            </m:sup>
+                          </m:sSup>
+                          <m:r>
+                            <a:rPr lang="en-US" i="1">
+                              <a:latin typeface="Cambria Math" panose="02040503050406030204" pitchFamily="18" charset="0"/>
+                              <a:cs typeface="Arial" panose="020B0604020202020204" pitchFamily="34" charset="0"/>
+                            </a:rPr>
+                            <m:t>+</m:t>
+                          </m:r>
+                          <m:sSup>
+                            <m:sSupPr>
+                              <m:ctrlPr>
+                                <a:rPr lang="en-US" i="1">
+                                  <a:latin typeface="Cambria Math" panose="02040503050406030204" pitchFamily="18" charset="0"/>
+                                  <a:cs typeface="Arial" panose="020B0604020202020204" pitchFamily="34" charset="0"/>
+                                </a:rPr>
+                              </m:ctrlPr>
+                            </m:sSupPr>
+                            <m:e>
+                              <m:r>
+                                <a:rPr lang="en-US" i="1">
+                                  <a:latin typeface="Cambria Math" panose="02040503050406030204" pitchFamily="18" charset="0"/>
+                                  <a:cs typeface="Arial" panose="020B0604020202020204" pitchFamily="34" charset="0"/>
+                                </a:rPr>
+                                <m:t>(−.</m:t>
+                              </m:r>
+                              <m:r>
+                                <a:rPr lang="en-US" b="0" i="1" smtClean="0">
+                                  <a:latin typeface="Cambria Math" panose="02040503050406030204" pitchFamily="18" charset="0"/>
+                                  <a:cs typeface="Arial" panose="020B0604020202020204" pitchFamily="34" charset="0"/>
+                                </a:rPr>
+                                <m:t>5</m:t>
+                              </m:r>
+                              <m:r>
+                                <a:rPr lang="en-US" i="1">
+                                  <a:latin typeface="Cambria Math" panose="02040503050406030204" pitchFamily="18" charset="0"/>
+                                  <a:cs typeface="Arial" panose="020B0604020202020204" pitchFamily="34" charset="0"/>
+                                </a:rPr>
+                                <m:t>)</m:t>
+                              </m:r>
+                            </m:e>
+                            <m:sup>
+                              <m:r>
+                                <a:rPr lang="en-US" i="1">
+                                  <a:latin typeface="Cambria Math" panose="02040503050406030204" pitchFamily="18" charset="0"/>
+                                  <a:cs typeface="Arial" panose="020B0604020202020204" pitchFamily="34" charset="0"/>
+                                </a:rPr>
+                                <m:t>2</m:t>
+                              </m:r>
+                            </m:sup>
+                          </m:sSup>
+                        </m:den>
+                      </m:f>
+                      <m:r>
+                        <a:rPr lang="en-US">
+                          <a:latin typeface="Cambria Math" panose="02040503050406030204" pitchFamily="18" charset="0"/>
+                          <a:cs typeface="Arial" panose="020B0604020202020204" pitchFamily="34" charset="0"/>
+                        </a:rPr>
+                        <m:t>=−.6349206</m:t>
+                      </m:r>
+                    </m:oMath>
+                  </m:oMathPara>
+                </a14:m>
+                <a:endParaRPr lang="en-US" dirty="0"/>
+              </a:p>
+            </p:txBody>
+          </p:sp>
+        </mc:Choice>
+        <mc:Fallback xmlns="">
+          <p:sp>
+            <p:nvSpPr>
+              <p:cNvPr id="11" name="Rectangle 10">
+                <a:extLst>
+                  <a:ext uri="{FF2B5EF4-FFF2-40B4-BE49-F238E27FC236}">
+                    <a16:creationId xmlns:a16="http://schemas.microsoft.com/office/drawing/2014/main" id="{9ADAD16E-25E1-4032-9385-BC709874F050}"/>
+                  </a:ext>
+                </a:extLst>
+              </p:cNvPr>
+              <p:cNvSpPr>
+                <a:spLocks noRot="1" noChangeAspect="1" noMove="1" noResize="1" noEditPoints="1" noAdjustHandles="1" noChangeArrowheads="1" noChangeShapeType="1" noTextEdit="1"/>
+              </p:cNvSpPr>
+              <p:nvPr/>
+            </p:nvSpPr>
+            <p:spPr>
+              <a:xfrm>
+                <a:off x="2883464" y="1371600"/>
+                <a:ext cx="6184336" cy="686535"/>
+              </a:xfrm>
+              <a:prstGeom prst="rect">
+                <a:avLst/>
+              </a:prstGeom>
+              <a:blipFill>
+                <a:blip r:embed="rId7"/>
+                <a:stretch>
+                  <a:fillRect/>
+                </a:stretch>
+              </a:blipFill>
+            </p:spPr>
+            <p:txBody>
+              <a:bodyPr/>
+              <a:lstStyle/>
+              <a:p>
+                <a:r>
+                  <a:rPr lang="en-US">
+                    <a:noFill/>
+                  </a:rPr>
+                  <a:t> </a:t>
+                </a:r>
+              </a:p>
+            </p:txBody>
+          </p:sp>
+        </mc:Fallback>
+      </mc:AlternateContent>
       <p:sp>
         <p:nvSpPr>
-          <p:cNvPr id="8" name="Rectangle 7">
+          <p:cNvPr id="14" name="Rectangle 13">
             <a:extLst>
               <a:ext uri="{FF2B5EF4-FFF2-40B4-BE49-F238E27FC236}">
-                <a16:creationId xmlns:a16="http://schemas.microsoft.com/office/drawing/2014/main" id="{A5205AAF-4781-4155-B2B6-451F06A873B9}"/>
+                <a16:creationId xmlns:a16="http://schemas.microsoft.com/office/drawing/2014/main" id="{DE3425E3-81AF-4532-8A0F-71DDBB410264}"/>
               </a:ext>
             </a:extLst>
           </p:cNvPr>
@@ -2638,8 +3253,8 @@
         </p:nvSpPr>
         <p:spPr>
           <a:xfrm>
-            <a:off x="304800" y="1865293"/>
-            <a:ext cx="8686800" cy="954107"/>
+            <a:off x="158750" y="4038600"/>
+            <a:ext cx="1765300" cy="923330"/>
           </a:xfrm>
           <a:prstGeom prst="rect">
             <a:avLst/>
@@ -2651,29 +3266,291 @@
           </a:bodyPr>
           <a:lstStyle/>
           <a:p>
-            <a:pPr algn="ctr"/>
-            <a:r>
-              <a:rPr lang="en-US" sz="2800" dirty="0"/>
-              <a:t>-.8/(1+.5) = -.5333</a:t>
-            </a:r>
-          </a:p>
-          <a:p>
-            <a:pPr algn="ctr"/>
-            <a:r>
-              <a:rPr lang="en-US" sz="2800" dirty="0"/>
-              <a:t>p</a:t>
-            </a:r>
-            <a:r>
-              <a:rPr lang="el-GR" sz="2800" dirty="0"/>
-              <a:t>1</a:t>
-            </a:r>
-            <a:r>
-              <a:rPr lang="en-US" sz="2800" dirty="0"/>
-              <a:t> = -.5333</a:t>
+            <a:r>
+              <a:rPr lang="en-US" dirty="0"/>
+              <a:t>Check it in R</a:t>
+            </a:r>
+          </a:p>
+          <a:p>
+            <a:r>
+              <a:rPr lang="en-US" dirty="0"/>
+              <a:t>p1$</a:t>
+            </a:r>
+            <a:r>
+              <a:rPr lang="en-US" dirty="0">
+                <a:highlight>
+                  <a:srgbClr val="FFFF00"/>
+                </a:highlight>
+              </a:rPr>
+              <a:t>aut1[2]</a:t>
+            </a:r>
+          </a:p>
+          <a:p>
+            <a:r>
+              <a:rPr lang="en-US" dirty="0"/>
+              <a:t>[1] </a:t>
+            </a:r>
+            <a:r>
+              <a:rPr lang="en-US" dirty="0">
+                <a:highlight>
+                  <a:srgbClr val="FFFF00"/>
+                </a:highlight>
+              </a:rPr>
+              <a:t>-0.6349206</a:t>
             </a:r>
           </a:p>
         </p:txBody>
       </p:sp>
+      <mc:AlternateContent xmlns:mc="http://schemas.openxmlformats.org/markup-compatibility/2006" xmlns:a14="http://schemas.microsoft.com/office/drawing/2010/main">
+        <mc:Choice Requires="a14">
+          <p:sp>
+            <p:nvSpPr>
+              <p:cNvPr id="16" name="Rectangle 15">
+                <a:extLst>
+                  <a:ext uri="{FF2B5EF4-FFF2-40B4-BE49-F238E27FC236}">
+                    <a16:creationId xmlns:a16="http://schemas.microsoft.com/office/drawing/2014/main" id="{FDEDBC6A-EC44-4C50-B7E6-51842A8E4BB5}"/>
+                  </a:ext>
+                </a:extLst>
+              </p:cNvPr>
+              <p:cNvSpPr/>
+              <p:nvPr/>
+            </p:nvSpPr>
+            <p:spPr>
+              <a:xfrm>
+                <a:off x="3193480" y="838200"/>
+                <a:ext cx="2757037" cy="369332"/>
+              </a:xfrm>
+              <a:prstGeom prst="rect">
+                <a:avLst/>
+              </a:prstGeom>
+            </p:spPr>
+            <p:txBody>
+              <a:bodyPr wrap="none">
+                <a:spAutoFit/>
+              </a:bodyPr>
+              <a:lstStyle/>
+              <a:p>
+                <a:pPr/>
+                <a14:m>
+                  <m:oMathPara xmlns:m="http://schemas.openxmlformats.org/officeDocument/2006/math">
+                    <m:oMathParaPr>
+                      <m:jc m:val="centerGroup"/>
+                    </m:oMathParaPr>
+                    <m:oMath xmlns:m="http://schemas.openxmlformats.org/officeDocument/2006/math">
+                      <m:sSub>
+                        <m:sSubPr>
+                          <m:ctrlPr>
+                            <a:rPr lang="en-US" i="1" smtClean="0">
+                              <a:latin typeface="Cambria Math" panose="02040503050406030204" pitchFamily="18" charset="0"/>
+                              <a:cs typeface="Arial" panose="020B0604020202020204" pitchFamily="34" charset="0"/>
+                            </a:rPr>
+                          </m:ctrlPr>
+                        </m:sSubPr>
+                        <m:e>
+                          <m:r>
+                            <a:rPr lang="en-US" i="1">
+                              <a:latin typeface="Cambria Math" panose="02040503050406030204" pitchFamily="18" charset="0"/>
+                              <a:cs typeface="Arial" panose="020B0604020202020204" pitchFamily="34" charset="0"/>
+                            </a:rPr>
+                            <m:t>𝑋</m:t>
+                          </m:r>
+                        </m:e>
+                        <m:sub>
+                          <m:r>
+                            <a:rPr lang="en-US" i="1">
+                              <a:latin typeface="Cambria Math" panose="02040503050406030204" pitchFamily="18" charset="0"/>
+                              <a:cs typeface="Arial" panose="020B0604020202020204" pitchFamily="34" charset="0"/>
+                            </a:rPr>
+                            <m:t>𝑡</m:t>
+                          </m:r>
+                        </m:sub>
+                      </m:sSub>
+                      <m:r>
+                        <a:rPr lang="en-US" i="1">
+                          <a:latin typeface="Cambria Math" panose="02040503050406030204" pitchFamily="18" charset="0"/>
+                          <a:cs typeface="Arial" panose="020B0604020202020204" pitchFamily="34" charset="0"/>
+                        </a:rPr>
+                        <m:t>=</m:t>
+                      </m:r>
+                      <m:sSub>
+                        <m:sSubPr>
+                          <m:ctrlPr>
+                            <a:rPr lang="en-US" i="1">
+                              <a:latin typeface="Cambria Math" panose="02040503050406030204" pitchFamily="18" charset="0"/>
+                              <a:cs typeface="Arial" panose="020B0604020202020204" pitchFamily="34" charset="0"/>
+                            </a:rPr>
+                          </m:ctrlPr>
+                        </m:sSubPr>
+                        <m:e>
+                          <m:r>
+                            <a:rPr lang="en-US" i="1">
+                              <a:latin typeface="Cambria Math" panose="02040503050406030204" pitchFamily="18" charset="0"/>
+                              <a:cs typeface="Arial" panose="020B0604020202020204" pitchFamily="34" charset="0"/>
+                            </a:rPr>
+                            <m:t>𝑎</m:t>
+                          </m:r>
+                        </m:e>
+                        <m:sub>
+                          <m:r>
+                            <a:rPr lang="en-US" i="1">
+                              <a:latin typeface="Cambria Math" panose="02040503050406030204" pitchFamily="18" charset="0"/>
+                              <a:cs typeface="Arial" panose="020B0604020202020204" pitchFamily="34" charset="0"/>
+                            </a:rPr>
+                            <m:t>𝑡</m:t>
+                          </m:r>
+                        </m:sub>
+                      </m:sSub>
+                      <m:r>
+                        <a:rPr lang="en-US" i="1">
+                          <a:latin typeface="Cambria Math" panose="02040503050406030204" pitchFamily="18" charset="0"/>
+                          <a:cs typeface="Arial" panose="020B0604020202020204" pitchFamily="34" charset="0"/>
+                        </a:rPr>
+                        <m:t>−.</m:t>
+                      </m:r>
+                      <m:r>
+                        <a:rPr lang="en-US" b="0" i="1" smtClean="0">
+                          <a:latin typeface="Cambria Math" panose="02040503050406030204" pitchFamily="18" charset="0"/>
+                          <a:cs typeface="Arial" panose="020B0604020202020204" pitchFamily="34" charset="0"/>
+                        </a:rPr>
+                        <m:t>8</m:t>
+                      </m:r>
+                      <m:sSub>
+                        <m:sSubPr>
+                          <m:ctrlPr>
+                            <a:rPr lang="en-US" i="1">
+                              <a:latin typeface="Cambria Math" panose="02040503050406030204" pitchFamily="18" charset="0"/>
+                              <a:cs typeface="Arial" panose="020B0604020202020204" pitchFamily="34" charset="0"/>
+                            </a:rPr>
+                          </m:ctrlPr>
+                        </m:sSubPr>
+                        <m:e>
+                          <m:r>
+                            <a:rPr lang="en-US" i="1">
+                              <a:latin typeface="Cambria Math" panose="02040503050406030204" pitchFamily="18" charset="0"/>
+                              <a:cs typeface="Arial" panose="020B0604020202020204" pitchFamily="34" charset="0"/>
+                            </a:rPr>
+                            <m:t>𝑎</m:t>
+                          </m:r>
+                        </m:e>
+                        <m:sub>
+                          <m:r>
+                            <a:rPr lang="en-US" i="1">
+                              <a:latin typeface="Cambria Math" panose="02040503050406030204" pitchFamily="18" charset="0"/>
+                              <a:cs typeface="Arial" panose="020B0604020202020204" pitchFamily="34" charset="0"/>
+                            </a:rPr>
+                            <m:t>𝑡</m:t>
+                          </m:r>
+                          <m:r>
+                            <a:rPr lang="en-US" i="1">
+                              <a:latin typeface="Cambria Math" panose="02040503050406030204" pitchFamily="18" charset="0"/>
+                              <a:cs typeface="Arial" panose="020B0604020202020204" pitchFamily="34" charset="0"/>
+                            </a:rPr>
+                            <m:t>−1</m:t>
+                          </m:r>
+                        </m:sub>
+                      </m:sSub>
+                      <m:r>
+                        <a:rPr lang="en-US" i="1">
+                          <a:latin typeface="Cambria Math" panose="02040503050406030204" pitchFamily="18" charset="0"/>
+                          <a:cs typeface="Arial" panose="020B0604020202020204" pitchFamily="34" charset="0"/>
+                        </a:rPr>
+                        <m:t>+.</m:t>
+                      </m:r>
+                      <m:r>
+                        <a:rPr lang="en-US" b="0" i="1" smtClean="0">
+                          <a:latin typeface="Cambria Math" panose="02040503050406030204" pitchFamily="18" charset="0"/>
+                          <a:cs typeface="Arial" panose="020B0604020202020204" pitchFamily="34" charset="0"/>
+                        </a:rPr>
+                        <m:t>5</m:t>
+                      </m:r>
+                      <m:sSub>
+                        <m:sSubPr>
+                          <m:ctrlPr>
+                            <a:rPr lang="en-US" i="1">
+                              <a:latin typeface="Cambria Math" panose="02040503050406030204" pitchFamily="18" charset="0"/>
+                              <a:cs typeface="Arial" panose="020B0604020202020204" pitchFamily="34" charset="0"/>
+                            </a:rPr>
+                          </m:ctrlPr>
+                        </m:sSubPr>
+                        <m:e>
+                          <m:r>
+                            <a:rPr lang="en-US" i="1">
+                              <a:latin typeface="Cambria Math" panose="02040503050406030204" pitchFamily="18" charset="0"/>
+                              <a:cs typeface="Arial" panose="020B0604020202020204" pitchFamily="34" charset="0"/>
+                            </a:rPr>
+                            <m:t>𝑎</m:t>
+                          </m:r>
+                        </m:e>
+                        <m:sub>
+                          <m:r>
+                            <a:rPr lang="en-US" i="1">
+                              <a:latin typeface="Cambria Math" panose="02040503050406030204" pitchFamily="18" charset="0"/>
+                              <a:cs typeface="Arial" panose="020B0604020202020204" pitchFamily="34" charset="0"/>
+                            </a:rPr>
+                            <m:t>𝑡</m:t>
+                          </m:r>
+                          <m:r>
+                            <a:rPr lang="en-US" i="1">
+                              <a:latin typeface="Cambria Math" panose="02040503050406030204" pitchFamily="18" charset="0"/>
+                              <a:cs typeface="Arial" panose="020B0604020202020204" pitchFamily="34" charset="0"/>
+                            </a:rPr>
+                            <m:t>−2</m:t>
+                          </m:r>
+                        </m:sub>
+                      </m:sSub>
+                    </m:oMath>
+                  </m:oMathPara>
+                </a14:m>
+                <a:endParaRPr lang="en-US" dirty="0"/>
+              </a:p>
+            </p:txBody>
+          </p:sp>
+        </mc:Choice>
+        <mc:Fallback xmlns="">
+          <p:sp>
+            <p:nvSpPr>
+              <p:cNvPr id="16" name="Rectangle 15">
+                <a:extLst>
+                  <a:ext uri="{FF2B5EF4-FFF2-40B4-BE49-F238E27FC236}">
+                    <a16:creationId xmlns:a16="http://schemas.microsoft.com/office/drawing/2014/main" id="{FDEDBC6A-EC44-4C50-B7E6-51842A8E4BB5}"/>
+                  </a:ext>
+                </a:extLst>
+              </p:cNvPr>
+              <p:cNvSpPr>
+                <a:spLocks noRot="1" noChangeAspect="1" noMove="1" noResize="1" noEditPoints="1" noAdjustHandles="1" noChangeArrowheads="1" noChangeShapeType="1" noTextEdit="1"/>
+              </p:cNvSpPr>
+              <p:nvPr/>
+            </p:nvSpPr>
+            <p:spPr>
+              <a:xfrm>
+                <a:off x="3193480" y="838200"/>
+                <a:ext cx="2757037" cy="369332"/>
+              </a:xfrm>
+              <a:prstGeom prst="rect">
+                <a:avLst/>
+              </a:prstGeom>
+              <a:blipFill>
+                <a:blip r:embed="rId8"/>
+                <a:stretch>
+                  <a:fillRect/>
+                </a:stretch>
+              </a:blipFill>
+            </p:spPr>
+            <p:txBody>
+              <a:bodyPr/>
+              <a:lstStyle/>
+              <a:p>
+                <a:r>
+                  <a:rPr lang="en-US">
+                    <a:noFill/>
+                  </a:rPr>
+                  <a:t> </a:t>
+                </a:r>
+              </a:p>
+            </p:txBody>
+          </p:sp>
+        </mc:Fallback>
+      </mc:AlternateContent>
     </p:spTree>
     <p:extLst>
       <p:ext uri="{BB962C8B-B14F-4D97-AF65-F5344CB8AC3E}">
@@ -2723,7 +3600,7 @@
         <p:spPr>
           <a:xfrm>
             <a:off x="565435" y="454223"/>
-            <a:ext cx="8013129" cy="615553"/>
+            <a:ext cx="8013129" cy="307777"/>
           </a:xfrm>
         </p:spPr>
         <p:txBody>
@@ -2734,17 +3611,6 @@
             <a:r>
               <a:rPr lang="en-US" sz="2000" dirty="0"/>
               <a:t>Represent the model as a GLP.</a:t>
-            </a:r>
-            <a:br>
-              <a:rPr lang="en-US" sz="2000" dirty="0"/>
-            </a:br>
-            <a:r>
-              <a:rPr lang="en-US" sz="2000" dirty="0" err="1"/>
-              <a:t>Xt</a:t>
-            </a:r>
-            <a:r>
-              <a:rPr lang="en-US" sz="2000" dirty="0"/>
-              <a:t> = at–.8at-1 + .5at–2</a:t>
             </a:r>
           </a:p>
         </p:txBody>
@@ -2798,8 +3664,8 @@
         </p:nvSpPr>
         <p:spPr>
           <a:xfrm>
-            <a:off x="304800" y="1981200"/>
-            <a:ext cx="8458200" cy="646331"/>
+            <a:off x="3428999" y="1371600"/>
+            <a:ext cx="2286000" cy="461665"/>
           </a:xfrm>
           <a:prstGeom prst="rect">
             <a:avLst/>
@@ -2813,43 +3679,788 @@
           <a:p>
             <a:pPr algn="ctr"/>
             <a:r>
-              <a:rPr lang="en-US" dirty="0"/>
-              <a:t>GPL Format</a:t>
-            </a:r>
-          </a:p>
-          <a:p>
-            <a:pPr algn="ctr"/>
-            <a:r>
-              <a:rPr lang="en-US" dirty="0" err="1"/>
-              <a:t>X</a:t>
-            </a:r>
-            <a:r>
-              <a:rPr lang="en-US" baseline="-25000" dirty="0" err="1"/>
-              <a:t>t</a:t>
-            </a:r>
-            <a:r>
-              <a:rPr lang="en-US" dirty="0"/>
-              <a:t> = 1 + at + (–.8a</a:t>
-            </a:r>
-            <a:r>
-              <a:rPr lang="en-US" sz="1400" dirty="0"/>
-              <a:t>t-1</a:t>
-            </a:r>
-            <a:r>
-              <a:rPr lang="en-US" dirty="0"/>
-              <a:t>) + (.5a</a:t>
-            </a:r>
-            <a:r>
-              <a:rPr lang="en-US" sz="1400" dirty="0"/>
-              <a:t>t–2</a:t>
-            </a:r>
-            <a:r>
-              <a:rPr lang="en-US" dirty="0"/>
-              <a:t>)</a:t>
+              <a:rPr lang="en-US" sz="2400" dirty="0"/>
+              <a:t>GLP Format</a:t>
             </a:r>
           </a:p>
         </p:txBody>
       </p:sp>
+      <mc:AlternateContent xmlns:mc="http://schemas.openxmlformats.org/markup-compatibility/2006" xmlns:a14="http://schemas.microsoft.com/office/drawing/2010/main">
+        <mc:Choice Requires="a14">
+          <p:sp>
+            <p:nvSpPr>
+              <p:cNvPr id="5" name="Rectangle 4">
+                <a:extLst>
+                  <a:ext uri="{FF2B5EF4-FFF2-40B4-BE49-F238E27FC236}">
+                    <a16:creationId xmlns:a16="http://schemas.microsoft.com/office/drawing/2014/main" id="{AF58A955-C1F6-4511-8353-8823DE11BBAD}"/>
+                  </a:ext>
+                </a:extLst>
+              </p:cNvPr>
+              <p:cNvSpPr/>
+              <p:nvPr/>
+            </p:nvSpPr>
+            <p:spPr>
+              <a:xfrm>
+                <a:off x="2928985" y="1804007"/>
+                <a:ext cx="3286028" cy="369332"/>
+              </a:xfrm>
+              <a:prstGeom prst="rect">
+                <a:avLst/>
+              </a:prstGeom>
+            </p:spPr>
+            <p:txBody>
+              <a:bodyPr wrap="none">
+                <a:spAutoFit/>
+              </a:bodyPr>
+              <a:lstStyle/>
+              <a:p>
+                <a:pPr/>
+                <a14:m>
+                  <m:oMathPara xmlns:m="http://schemas.openxmlformats.org/officeDocument/2006/math">
+                    <m:oMathParaPr>
+                      <m:jc m:val="centerGroup"/>
+                    </m:oMathParaPr>
+                    <m:oMath xmlns:m="http://schemas.openxmlformats.org/officeDocument/2006/math">
+                      <m:sSub>
+                        <m:sSubPr>
+                          <m:ctrlPr>
+                            <a:rPr lang="en-US" i="1" smtClean="0">
+                              <a:latin typeface="Cambria Math" panose="02040503050406030204" pitchFamily="18" charset="0"/>
+                              <a:cs typeface="Arial" panose="020B0604020202020204" pitchFamily="34" charset="0"/>
+                            </a:rPr>
+                          </m:ctrlPr>
+                        </m:sSubPr>
+                        <m:e>
+                          <m:r>
+                            <a:rPr lang="en-US" i="1">
+                              <a:latin typeface="Cambria Math" panose="02040503050406030204" pitchFamily="18" charset="0"/>
+                              <a:cs typeface="Arial" panose="020B0604020202020204" pitchFamily="34" charset="0"/>
+                            </a:rPr>
+                            <m:t>𝑋</m:t>
+                          </m:r>
+                        </m:e>
+                        <m:sub>
+                          <m:r>
+                            <a:rPr lang="en-US" i="1">
+                              <a:latin typeface="Cambria Math" panose="02040503050406030204" pitchFamily="18" charset="0"/>
+                              <a:cs typeface="Arial" panose="020B0604020202020204" pitchFamily="34" charset="0"/>
+                            </a:rPr>
+                            <m:t>𝑡</m:t>
+                          </m:r>
+                        </m:sub>
+                      </m:sSub>
+                      <m:r>
+                        <a:rPr lang="en-US" i="1">
+                          <a:latin typeface="Cambria Math" panose="02040503050406030204" pitchFamily="18" charset="0"/>
+                          <a:cs typeface="Arial" panose="020B0604020202020204" pitchFamily="34" charset="0"/>
+                        </a:rPr>
+                        <m:t>=</m:t>
+                      </m:r>
+                      <m:r>
+                        <a:rPr lang="en-US" b="0" i="1" smtClean="0">
+                          <a:latin typeface="Cambria Math" panose="02040503050406030204" pitchFamily="18" charset="0"/>
+                          <a:cs typeface="Arial" panose="020B0604020202020204" pitchFamily="34" charset="0"/>
+                        </a:rPr>
+                        <m:t>1</m:t>
+                      </m:r>
+                      <m:r>
+                        <a:rPr lang="en-US" i="1">
+                          <a:latin typeface="Cambria Math" panose="02040503050406030204" pitchFamily="18" charset="0"/>
+                          <a:cs typeface="Arial" panose="020B0604020202020204" pitchFamily="34" charset="0"/>
+                        </a:rPr>
+                        <m:t>+</m:t>
+                      </m:r>
+                      <m:sSub>
+                        <m:sSubPr>
+                          <m:ctrlPr>
+                            <a:rPr lang="en-US" i="1">
+                              <a:latin typeface="Cambria Math" panose="02040503050406030204" pitchFamily="18" charset="0"/>
+                              <a:cs typeface="Arial" panose="020B0604020202020204" pitchFamily="34" charset="0"/>
+                            </a:rPr>
+                          </m:ctrlPr>
+                        </m:sSubPr>
+                        <m:e>
+                          <m:r>
+                            <a:rPr lang="en-US" i="1">
+                              <a:latin typeface="Cambria Math" panose="02040503050406030204" pitchFamily="18" charset="0"/>
+                              <a:cs typeface="Arial" panose="020B0604020202020204" pitchFamily="34" charset="0"/>
+                            </a:rPr>
+                            <m:t>𝑎</m:t>
+                          </m:r>
+                        </m:e>
+                        <m:sub>
+                          <m:r>
+                            <a:rPr lang="en-US" i="1">
+                              <a:latin typeface="Cambria Math" panose="02040503050406030204" pitchFamily="18" charset="0"/>
+                              <a:cs typeface="Arial" panose="020B0604020202020204" pitchFamily="34" charset="0"/>
+                            </a:rPr>
+                            <m:t>𝑡</m:t>
+                          </m:r>
+                        </m:sub>
+                      </m:sSub>
+                      <m:r>
+                        <a:rPr lang="en-US" i="1">
+                          <a:latin typeface="Cambria Math" panose="02040503050406030204" pitchFamily="18" charset="0"/>
+                          <a:cs typeface="Arial" panose="020B0604020202020204" pitchFamily="34" charset="0"/>
+                        </a:rPr>
+                        <m:t>+−.</m:t>
+                      </m:r>
+                      <m:r>
+                        <a:rPr lang="en-US" b="0" i="1" smtClean="0">
+                          <a:latin typeface="Cambria Math" panose="02040503050406030204" pitchFamily="18" charset="0"/>
+                          <a:cs typeface="Arial" panose="020B0604020202020204" pitchFamily="34" charset="0"/>
+                        </a:rPr>
+                        <m:t>8</m:t>
+                      </m:r>
+                      <m:sSub>
+                        <m:sSubPr>
+                          <m:ctrlPr>
+                            <a:rPr lang="en-US" i="1">
+                              <a:latin typeface="Cambria Math" panose="02040503050406030204" pitchFamily="18" charset="0"/>
+                              <a:cs typeface="Arial" panose="020B0604020202020204" pitchFamily="34" charset="0"/>
+                            </a:rPr>
+                          </m:ctrlPr>
+                        </m:sSubPr>
+                        <m:e>
+                          <m:r>
+                            <a:rPr lang="en-US" i="1">
+                              <a:latin typeface="Cambria Math" panose="02040503050406030204" pitchFamily="18" charset="0"/>
+                              <a:cs typeface="Arial" panose="020B0604020202020204" pitchFamily="34" charset="0"/>
+                            </a:rPr>
+                            <m:t>𝑎</m:t>
+                          </m:r>
+                        </m:e>
+                        <m:sub>
+                          <m:r>
+                            <a:rPr lang="en-US" i="1">
+                              <a:latin typeface="Cambria Math" panose="02040503050406030204" pitchFamily="18" charset="0"/>
+                              <a:cs typeface="Arial" panose="020B0604020202020204" pitchFamily="34" charset="0"/>
+                            </a:rPr>
+                            <m:t>𝑡</m:t>
+                          </m:r>
+                          <m:r>
+                            <a:rPr lang="en-US" i="1">
+                              <a:latin typeface="Cambria Math" panose="02040503050406030204" pitchFamily="18" charset="0"/>
+                              <a:cs typeface="Arial" panose="020B0604020202020204" pitchFamily="34" charset="0"/>
+                            </a:rPr>
+                            <m:t>−1</m:t>
+                          </m:r>
+                        </m:sub>
+                      </m:sSub>
+                      <m:r>
+                        <a:rPr lang="en-US" i="1">
+                          <a:latin typeface="Cambria Math" panose="02040503050406030204" pitchFamily="18" charset="0"/>
+                          <a:cs typeface="Arial" panose="020B0604020202020204" pitchFamily="34" charset="0"/>
+                        </a:rPr>
+                        <m:t>+</m:t>
+                      </m:r>
+                      <m:r>
+                        <a:rPr lang="en-US" b="0" i="1" smtClean="0">
+                          <a:latin typeface="Cambria Math" panose="02040503050406030204" pitchFamily="18" charset="0"/>
+                          <a:cs typeface="Arial" panose="020B0604020202020204" pitchFamily="34" charset="0"/>
+                        </a:rPr>
+                        <m:t>5</m:t>
+                      </m:r>
+                      <m:sSub>
+                        <m:sSubPr>
+                          <m:ctrlPr>
+                            <a:rPr lang="en-US" i="1">
+                              <a:latin typeface="Cambria Math" panose="02040503050406030204" pitchFamily="18" charset="0"/>
+                              <a:cs typeface="Arial" panose="020B0604020202020204" pitchFamily="34" charset="0"/>
+                            </a:rPr>
+                          </m:ctrlPr>
+                        </m:sSubPr>
+                        <m:e>
+                          <m:r>
+                            <a:rPr lang="en-US" i="1">
+                              <a:latin typeface="Cambria Math" panose="02040503050406030204" pitchFamily="18" charset="0"/>
+                              <a:cs typeface="Arial" panose="020B0604020202020204" pitchFamily="34" charset="0"/>
+                            </a:rPr>
+                            <m:t>𝑎</m:t>
+                          </m:r>
+                        </m:e>
+                        <m:sub>
+                          <m:r>
+                            <a:rPr lang="en-US" i="1">
+                              <a:latin typeface="Cambria Math" panose="02040503050406030204" pitchFamily="18" charset="0"/>
+                              <a:cs typeface="Arial" panose="020B0604020202020204" pitchFamily="34" charset="0"/>
+                            </a:rPr>
+                            <m:t>𝑡</m:t>
+                          </m:r>
+                          <m:r>
+                            <a:rPr lang="en-US" i="1">
+                              <a:latin typeface="Cambria Math" panose="02040503050406030204" pitchFamily="18" charset="0"/>
+                              <a:cs typeface="Arial" panose="020B0604020202020204" pitchFamily="34" charset="0"/>
+                            </a:rPr>
+                            <m:t>−2</m:t>
+                          </m:r>
+                        </m:sub>
+                      </m:sSub>
+                    </m:oMath>
+                  </m:oMathPara>
+                </a14:m>
+                <a:endParaRPr lang="en-US" dirty="0"/>
+              </a:p>
+            </p:txBody>
+          </p:sp>
+        </mc:Choice>
+        <mc:Fallback xmlns="">
+          <p:sp>
+            <p:nvSpPr>
+              <p:cNvPr id="5" name="Rectangle 4">
+                <a:extLst>
+                  <a:ext uri="{FF2B5EF4-FFF2-40B4-BE49-F238E27FC236}">
+                    <a16:creationId xmlns:a16="http://schemas.microsoft.com/office/drawing/2014/main" id="{AF58A955-C1F6-4511-8353-8823DE11BBAD}"/>
+                  </a:ext>
+                </a:extLst>
+              </p:cNvPr>
+              <p:cNvSpPr>
+                <a:spLocks noRot="1" noChangeAspect="1" noMove="1" noResize="1" noEditPoints="1" noAdjustHandles="1" noChangeArrowheads="1" noChangeShapeType="1" noTextEdit="1"/>
+              </p:cNvSpPr>
+              <p:nvPr/>
+            </p:nvSpPr>
+            <p:spPr>
+              <a:xfrm>
+                <a:off x="2928985" y="1804007"/>
+                <a:ext cx="3286028" cy="369332"/>
+              </a:xfrm>
+              <a:prstGeom prst="rect">
+                <a:avLst/>
+              </a:prstGeom>
+              <a:blipFill>
+                <a:blip r:embed="rId3"/>
+                <a:stretch>
+                  <a:fillRect/>
+                </a:stretch>
+              </a:blipFill>
+            </p:spPr>
+            <p:txBody>
+              <a:bodyPr/>
+              <a:lstStyle/>
+              <a:p>
+                <a:r>
+                  <a:rPr lang="en-US">
+                    <a:noFill/>
+                  </a:rPr>
+                  <a:t> </a:t>
+                </a:r>
+              </a:p>
+            </p:txBody>
+          </p:sp>
+        </mc:Fallback>
+      </mc:AlternateContent>
+      <p:pic>
+        <p:nvPicPr>
+          <p:cNvPr id="6" name="Picture 5">
+            <a:extLst>
+              <a:ext uri="{FF2B5EF4-FFF2-40B4-BE49-F238E27FC236}">
+                <a16:creationId xmlns:a16="http://schemas.microsoft.com/office/drawing/2014/main" id="{D5063CE4-3BC2-41B4-A61C-77BC193CFE4B}"/>
+              </a:ext>
+            </a:extLst>
+          </p:cNvPr>
+          <p:cNvPicPr>
+            <a:picLocks noChangeAspect="1"/>
+          </p:cNvPicPr>
+          <p:nvPr/>
+        </p:nvPicPr>
+        <p:blipFill rotWithShape="1">
+          <a:blip r:embed="rId4">
+            <a:extLst>
+              <a:ext uri="{28A0092B-C50C-407E-A947-70E740481C1C}">
+                <a14:useLocalDpi xmlns:a14="http://schemas.microsoft.com/office/drawing/2010/main" val="0"/>
+              </a:ext>
+            </a:extLst>
+          </a:blip>
+          <a:srcRect t="10803"/>
+          <a:stretch/>
+        </p:blipFill>
+        <p:spPr>
+          <a:xfrm>
+            <a:off x="1726129" y="2667000"/>
+            <a:ext cx="5691740" cy="907067"/>
+          </a:xfrm>
+          <a:prstGeom prst="rect">
+            <a:avLst/>
+          </a:prstGeom>
+        </p:spPr>
+      </p:pic>
+      <p:sp>
+        <p:nvSpPr>
+          <p:cNvPr id="7" name="TextBox 6">
+            <a:extLst>
+              <a:ext uri="{FF2B5EF4-FFF2-40B4-BE49-F238E27FC236}">
+                <a16:creationId xmlns:a16="http://schemas.microsoft.com/office/drawing/2014/main" id="{E36BDB3E-6BB0-474D-B988-54474A9A8E3A}"/>
+              </a:ext>
+            </a:extLst>
+          </p:cNvPr>
+          <p:cNvSpPr txBox="1"/>
+          <p:nvPr/>
+        </p:nvSpPr>
+        <p:spPr bwMode="auto">
+          <a:xfrm>
+            <a:off x="495299" y="4098737"/>
+            <a:ext cx="8153400" cy="1785104"/>
+          </a:xfrm>
+          <a:prstGeom prst="rect">
+            <a:avLst/>
+          </a:prstGeom>
+          <a:noFill/>
+          <a:ln>
+            <a:noFill/>
+          </a:ln>
+          <a:extLst>
+            <a:ext uri="{909E8E84-426E-40DD-AFC4-6F175D3DCCD1}">
+              <a14:hiddenFill xmlns:a14="http://schemas.microsoft.com/office/drawing/2010/main">
+                <a:solidFill>
+                  <a:srgbClr val="FFFFFF"/>
+                </a:solidFill>
+              </a14:hiddenFill>
+            </a:ext>
+            <a:ext uri="{91240B29-F687-4F45-9708-019B960494DF}">
+              <a14:hiddenLine xmlns:a14="http://schemas.microsoft.com/office/drawing/2010/main" w="9525">
+                <a:solidFill>
+                  <a:srgbClr val="000000"/>
+                </a:solidFill>
+                <a:miter lim="800000"/>
+                <a:headEnd/>
+                <a:tailEnd/>
+              </a14:hiddenLine>
+            </a:ext>
+          </a:extLst>
+        </p:spPr>
+        <p:txBody>
+          <a:bodyPr wrap="square" rtlCol="0">
+            <a:noAutofit/>
+          </a:bodyPr>
+          <a:lstStyle/>
+          <a:p>
+            <a:pPr marL="0" marR="0" lvl="0" indent="0" algn="l" defTabSz="914400" rtl="0" eaLnBrk="1" fontAlgn="auto" latinLnBrk="0" hangingPunct="1">
+              <a:lnSpc>
+                <a:spcPct val="100000"/>
+              </a:lnSpc>
+              <a:spcBef>
+                <a:spcPts val="600"/>
+              </a:spcBef>
+              <a:spcAft>
+                <a:spcPts val="0"/>
+              </a:spcAft>
+              <a:buClrTx/>
+              <a:buSzTx/>
+              <a:buFontTx/>
+              <a:buNone/>
+              <a:tabLst/>
+              <a:defRPr/>
+            </a:pPr>
+            <a:r>
+              <a:rPr kumimoji="0" lang="en-US" sz="2800" b="1" i="0" u="none" strike="noStrike" kern="1200" cap="none" spc="0" normalizeH="0" baseline="0" noProof="0" dirty="0">
+                <a:ln>
+                  <a:noFill/>
+                </a:ln>
+                <a:effectLst/>
+                <a:uLnTx/>
+                <a:uFillTx/>
+                <a:latin typeface="Arial" panose="020B0604020202020204" pitchFamily="34" charset="0"/>
+                <a:ea typeface="+mn-ea"/>
+                <a:cs typeface="Arial" panose="020B0604020202020204" pitchFamily="34" charset="0"/>
+              </a:rPr>
+              <a:t>Notes:</a:t>
+            </a:r>
+          </a:p>
+          <a:p>
+            <a:pPr marL="457200" marR="0" lvl="0" indent="-457200" algn="l" defTabSz="914400" rtl="0" eaLnBrk="1" fontAlgn="auto" latinLnBrk="0" hangingPunct="1">
+              <a:lnSpc>
+                <a:spcPct val="100000"/>
+              </a:lnSpc>
+              <a:spcBef>
+                <a:spcPts val="600"/>
+              </a:spcBef>
+              <a:spcAft>
+                <a:spcPts val="0"/>
+              </a:spcAft>
+              <a:buClrTx/>
+              <a:buSzTx/>
+              <a:buFont typeface="Arial" panose="020B0604020202020204" pitchFamily="34" charset="0"/>
+              <a:buChar char="•"/>
+              <a:tabLst/>
+              <a:defRPr/>
+            </a:pPr>
+            <a:r>
+              <a:rPr kumimoji="0" lang="en-US" sz="2400" b="0" i="1" u="none" strike="noStrike" kern="1200" cap="none" spc="0" normalizeH="0" baseline="0" noProof="0" dirty="0">
+                <a:ln>
+                  <a:noFill/>
+                </a:ln>
+                <a:effectLst/>
+                <a:uLnTx/>
+                <a:uFillTx/>
+                <a:latin typeface="Times New Roman" panose="02020603050405020304" pitchFamily="18" charset="0"/>
+                <a:ea typeface="+mn-ea"/>
+                <a:cs typeface="Times New Roman" panose="02020603050405020304" pitchFamily="18" charset="0"/>
+              </a:rPr>
+              <a:t>X</a:t>
+            </a:r>
+            <a:r>
+              <a:rPr kumimoji="0" lang="en-US" sz="2400" b="0" i="1" u="none" strike="noStrike" kern="1200" cap="none" spc="0" normalizeH="0" baseline="-25000" noProof="0" dirty="0">
+                <a:ln>
+                  <a:noFill/>
+                </a:ln>
+                <a:effectLst/>
+                <a:uLnTx/>
+                <a:uFillTx/>
+                <a:latin typeface="Times New Roman" panose="02020603050405020304" pitchFamily="18" charset="0"/>
+                <a:ea typeface="+mn-ea"/>
+                <a:cs typeface="Times New Roman" panose="02020603050405020304" pitchFamily="18" charset="0"/>
+              </a:rPr>
+              <a:t>t</a:t>
+            </a:r>
+            <a:r>
+              <a:rPr kumimoji="0" lang="en-US" sz="2400" b="0" i="0" u="none" strike="noStrike" kern="1200" cap="none" spc="0" normalizeH="0" baseline="0" noProof="0" dirty="0">
+                <a:ln>
+                  <a:noFill/>
+                </a:ln>
+                <a:effectLst/>
+                <a:uLnTx/>
+                <a:uFillTx/>
+                <a:latin typeface="Arial" panose="020B0604020202020204" pitchFamily="34" charset="0"/>
+                <a:ea typeface="+mn-ea"/>
+                <a:cs typeface="Arial" panose="020B0604020202020204" pitchFamily="34" charset="0"/>
+              </a:rPr>
+              <a:t> at time </a:t>
+            </a:r>
+            <a:r>
+              <a:rPr kumimoji="0" lang="en-US" sz="2400" b="0" i="1" u="none" strike="noStrike" kern="1200" cap="none" spc="0" normalizeH="0" baseline="0" noProof="0" dirty="0">
+                <a:ln>
+                  <a:noFill/>
+                </a:ln>
+                <a:effectLst/>
+                <a:uLnTx/>
+                <a:uFillTx/>
+                <a:latin typeface="Times New Roman" panose="02020603050405020304" pitchFamily="18" charset="0"/>
+                <a:ea typeface="+mn-ea"/>
+                <a:cs typeface="Times New Roman" panose="02020603050405020304" pitchFamily="18" charset="0"/>
+              </a:rPr>
+              <a:t>t</a:t>
+            </a:r>
+            <a:r>
+              <a:rPr kumimoji="0" lang="en-US" sz="2400" b="0" i="0" u="none" strike="noStrike" kern="1200" cap="none" spc="0" normalizeH="0" baseline="0" noProof="0" dirty="0">
+                <a:ln>
+                  <a:noFill/>
+                </a:ln>
+                <a:effectLst/>
+                <a:uLnTx/>
+                <a:uFillTx/>
+                <a:latin typeface="Arial" panose="020B0604020202020204" pitchFamily="34" charset="0"/>
+                <a:ea typeface="+mn-ea"/>
+                <a:cs typeface="Arial" panose="020B0604020202020204" pitchFamily="34" charset="0"/>
+              </a:rPr>
+              <a:t> is a linear combination of present and past noise components</a:t>
+            </a:r>
+          </a:p>
+          <a:p>
+            <a:pPr marL="457200" marR="0" lvl="0" indent="-457200" algn="l" defTabSz="914400" rtl="0" eaLnBrk="1" fontAlgn="auto" latinLnBrk="0" hangingPunct="1">
+              <a:lnSpc>
+                <a:spcPct val="100000"/>
+              </a:lnSpc>
+              <a:spcBef>
+                <a:spcPts val="600"/>
+              </a:spcBef>
+              <a:spcAft>
+                <a:spcPts val="0"/>
+              </a:spcAft>
+              <a:buClrTx/>
+              <a:buSzTx/>
+              <a:buFont typeface="Arial" panose="020B0604020202020204" pitchFamily="34" charset="0"/>
+              <a:buChar char="•"/>
+              <a:tabLst/>
+              <a:defRPr/>
+            </a:pPr>
+            <a:r>
+              <a:rPr kumimoji="0" lang="en-US" sz="2400" b="0" i="0" u="none" strike="noStrike" kern="1200" cap="none" spc="0" normalizeH="0" baseline="0" noProof="0" dirty="0">
+                <a:ln>
+                  <a:noFill/>
+                </a:ln>
+                <a:effectLst/>
+                <a:uLnTx/>
+                <a:uFillTx/>
+                <a:latin typeface="Arial" panose="020B0604020202020204" pitchFamily="34" charset="0"/>
+                <a:ea typeface="+mn-ea"/>
+                <a:cs typeface="Arial" panose="020B0604020202020204" pitchFamily="34" charset="0"/>
+              </a:rPr>
+              <a:t>An MA(</a:t>
+            </a:r>
+            <a:r>
+              <a:rPr lang="en-US" sz="2400" i="1" dirty="0">
+                <a:latin typeface="Arial" panose="020B0604020202020204" pitchFamily="34" charset="0"/>
+                <a:cs typeface="Arial" panose="020B0604020202020204" pitchFamily="34" charset="0"/>
+              </a:rPr>
+              <a:t>q</a:t>
+            </a:r>
+            <a:r>
+              <a:rPr kumimoji="0" lang="en-US" sz="2400" b="0" i="0" u="none" strike="noStrike" kern="1200" cap="none" spc="0" normalizeH="0" baseline="0" noProof="0" dirty="0">
+                <a:ln>
+                  <a:noFill/>
+                </a:ln>
+                <a:effectLst/>
+                <a:uLnTx/>
+                <a:uFillTx/>
+                <a:latin typeface="Arial" panose="020B0604020202020204" pitchFamily="34" charset="0"/>
+                <a:ea typeface="+mn-ea"/>
+                <a:cs typeface="Arial" panose="020B0604020202020204" pitchFamily="34" charset="0"/>
+              </a:rPr>
+              <a:t>) is a finite GLP and is always stationary</a:t>
+            </a:r>
+          </a:p>
+        </p:txBody>
+      </p:sp>
+      <mc:AlternateContent xmlns:mc="http://schemas.openxmlformats.org/markup-compatibility/2006" xmlns:a14="http://schemas.microsoft.com/office/drawing/2010/main">
+        <mc:Choice Requires="a14">
+          <p:sp>
+            <p:nvSpPr>
+              <p:cNvPr id="8" name="Rectangle 7">
+                <a:extLst>
+                  <a:ext uri="{FF2B5EF4-FFF2-40B4-BE49-F238E27FC236}">
+                    <a16:creationId xmlns:a16="http://schemas.microsoft.com/office/drawing/2014/main" id="{0684F5C3-33C3-4287-AF11-5265B86FE464}"/>
+                  </a:ext>
+                </a:extLst>
+              </p:cNvPr>
+              <p:cNvSpPr/>
+              <p:nvPr/>
+            </p:nvSpPr>
+            <p:spPr>
+              <a:xfrm>
+                <a:off x="3193480" y="762000"/>
+                <a:ext cx="2757037" cy="369332"/>
+              </a:xfrm>
+              <a:prstGeom prst="rect">
+                <a:avLst/>
+              </a:prstGeom>
+            </p:spPr>
+            <p:txBody>
+              <a:bodyPr wrap="none">
+                <a:spAutoFit/>
+              </a:bodyPr>
+              <a:lstStyle/>
+              <a:p>
+                <a:pPr/>
+                <a14:m>
+                  <m:oMathPara xmlns:m="http://schemas.openxmlformats.org/officeDocument/2006/math">
+                    <m:oMathParaPr>
+                      <m:jc m:val="centerGroup"/>
+                    </m:oMathParaPr>
+                    <m:oMath xmlns:m="http://schemas.openxmlformats.org/officeDocument/2006/math">
+                      <m:sSub>
+                        <m:sSubPr>
+                          <m:ctrlPr>
+                            <a:rPr lang="en-US" i="1" smtClean="0">
+                              <a:latin typeface="Cambria Math" panose="02040503050406030204" pitchFamily="18" charset="0"/>
+                              <a:cs typeface="Arial" panose="020B0604020202020204" pitchFamily="34" charset="0"/>
+                            </a:rPr>
+                          </m:ctrlPr>
+                        </m:sSubPr>
+                        <m:e>
+                          <m:r>
+                            <a:rPr lang="en-US" i="1">
+                              <a:latin typeface="Cambria Math" panose="02040503050406030204" pitchFamily="18" charset="0"/>
+                              <a:cs typeface="Arial" panose="020B0604020202020204" pitchFamily="34" charset="0"/>
+                            </a:rPr>
+                            <m:t>𝑋</m:t>
+                          </m:r>
+                        </m:e>
+                        <m:sub>
+                          <m:r>
+                            <a:rPr lang="en-US" i="1">
+                              <a:latin typeface="Cambria Math" panose="02040503050406030204" pitchFamily="18" charset="0"/>
+                              <a:cs typeface="Arial" panose="020B0604020202020204" pitchFamily="34" charset="0"/>
+                            </a:rPr>
+                            <m:t>𝑡</m:t>
+                          </m:r>
+                        </m:sub>
+                      </m:sSub>
+                      <m:r>
+                        <a:rPr lang="en-US" i="1">
+                          <a:latin typeface="Cambria Math" panose="02040503050406030204" pitchFamily="18" charset="0"/>
+                          <a:cs typeface="Arial" panose="020B0604020202020204" pitchFamily="34" charset="0"/>
+                        </a:rPr>
+                        <m:t>=</m:t>
+                      </m:r>
+                      <m:sSub>
+                        <m:sSubPr>
+                          <m:ctrlPr>
+                            <a:rPr lang="en-US" i="1">
+                              <a:latin typeface="Cambria Math" panose="02040503050406030204" pitchFamily="18" charset="0"/>
+                              <a:cs typeface="Arial" panose="020B0604020202020204" pitchFamily="34" charset="0"/>
+                            </a:rPr>
+                          </m:ctrlPr>
+                        </m:sSubPr>
+                        <m:e>
+                          <m:r>
+                            <a:rPr lang="en-US" i="1">
+                              <a:latin typeface="Cambria Math" panose="02040503050406030204" pitchFamily="18" charset="0"/>
+                              <a:cs typeface="Arial" panose="020B0604020202020204" pitchFamily="34" charset="0"/>
+                            </a:rPr>
+                            <m:t>𝑎</m:t>
+                          </m:r>
+                        </m:e>
+                        <m:sub>
+                          <m:r>
+                            <a:rPr lang="en-US" i="1">
+                              <a:latin typeface="Cambria Math" panose="02040503050406030204" pitchFamily="18" charset="0"/>
+                              <a:cs typeface="Arial" panose="020B0604020202020204" pitchFamily="34" charset="0"/>
+                            </a:rPr>
+                            <m:t>𝑡</m:t>
+                          </m:r>
+                        </m:sub>
+                      </m:sSub>
+                      <m:r>
+                        <a:rPr lang="en-US" i="1">
+                          <a:latin typeface="Cambria Math" panose="02040503050406030204" pitchFamily="18" charset="0"/>
+                          <a:cs typeface="Arial" panose="020B0604020202020204" pitchFamily="34" charset="0"/>
+                        </a:rPr>
+                        <m:t>−.</m:t>
+                      </m:r>
+                      <m:r>
+                        <a:rPr lang="en-US" b="0" i="1" smtClean="0">
+                          <a:latin typeface="Cambria Math" panose="02040503050406030204" pitchFamily="18" charset="0"/>
+                          <a:cs typeface="Arial" panose="020B0604020202020204" pitchFamily="34" charset="0"/>
+                        </a:rPr>
+                        <m:t>8</m:t>
+                      </m:r>
+                      <m:sSub>
+                        <m:sSubPr>
+                          <m:ctrlPr>
+                            <a:rPr lang="en-US" i="1">
+                              <a:latin typeface="Cambria Math" panose="02040503050406030204" pitchFamily="18" charset="0"/>
+                              <a:cs typeface="Arial" panose="020B0604020202020204" pitchFamily="34" charset="0"/>
+                            </a:rPr>
+                          </m:ctrlPr>
+                        </m:sSubPr>
+                        <m:e>
+                          <m:r>
+                            <a:rPr lang="en-US" i="1">
+                              <a:latin typeface="Cambria Math" panose="02040503050406030204" pitchFamily="18" charset="0"/>
+                              <a:cs typeface="Arial" panose="020B0604020202020204" pitchFamily="34" charset="0"/>
+                            </a:rPr>
+                            <m:t>𝑎</m:t>
+                          </m:r>
+                        </m:e>
+                        <m:sub>
+                          <m:r>
+                            <a:rPr lang="en-US" i="1">
+                              <a:latin typeface="Cambria Math" panose="02040503050406030204" pitchFamily="18" charset="0"/>
+                              <a:cs typeface="Arial" panose="020B0604020202020204" pitchFamily="34" charset="0"/>
+                            </a:rPr>
+                            <m:t>𝑡</m:t>
+                          </m:r>
+                          <m:r>
+                            <a:rPr lang="en-US" i="1">
+                              <a:latin typeface="Cambria Math" panose="02040503050406030204" pitchFamily="18" charset="0"/>
+                              <a:cs typeface="Arial" panose="020B0604020202020204" pitchFamily="34" charset="0"/>
+                            </a:rPr>
+                            <m:t>−1</m:t>
+                          </m:r>
+                        </m:sub>
+                      </m:sSub>
+                      <m:r>
+                        <a:rPr lang="en-US" i="1">
+                          <a:latin typeface="Cambria Math" panose="02040503050406030204" pitchFamily="18" charset="0"/>
+                          <a:cs typeface="Arial" panose="020B0604020202020204" pitchFamily="34" charset="0"/>
+                        </a:rPr>
+                        <m:t>+.</m:t>
+                      </m:r>
+                      <m:r>
+                        <a:rPr lang="en-US" b="0" i="1" smtClean="0">
+                          <a:latin typeface="Cambria Math" panose="02040503050406030204" pitchFamily="18" charset="0"/>
+                          <a:cs typeface="Arial" panose="020B0604020202020204" pitchFamily="34" charset="0"/>
+                        </a:rPr>
+                        <m:t>5</m:t>
+                      </m:r>
+                      <m:sSub>
+                        <m:sSubPr>
+                          <m:ctrlPr>
+                            <a:rPr lang="en-US" i="1">
+                              <a:latin typeface="Cambria Math" panose="02040503050406030204" pitchFamily="18" charset="0"/>
+                              <a:cs typeface="Arial" panose="020B0604020202020204" pitchFamily="34" charset="0"/>
+                            </a:rPr>
+                          </m:ctrlPr>
+                        </m:sSubPr>
+                        <m:e>
+                          <m:r>
+                            <a:rPr lang="en-US" i="1">
+                              <a:latin typeface="Cambria Math" panose="02040503050406030204" pitchFamily="18" charset="0"/>
+                              <a:cs typeface="Arial" panose="020B0604020202020204" pitchFamily="34" charset="0"/>
+                            </a:rPr>
+                            <m:t>𝑎</m:t>
+                          </m:r>
+                        </m:e>
+                        <m:sub>
+                          <m:r>
+                            <a:rPr lang="en-US" i="1">
+                              <a:latin typeface="Cambria Math" panose="02040503050406030204" pitchFamily="18" charset="0"/>
+                              <a:cs typeface="Arial" panose="020B0604020202020204" pitchFamily="34" charset="0"/>
+                            </a:rPr>
+                            <m:t>𝑡</m:t>
+                          </m:r>
+                          <m:r>
+                            <a:rPr lang="en-US" i="1">
+                              <a:latin typeface="Cambria Math" panose="02040503050406030204" pitchFamily="18" charset="0"/>
+                              <a:cs typeface="Arial" panose="020B0604020202020204" pitchFamily="34" charset="0"/>
+                            </a:rPr>
+                            <m:t>−2</m:t>
+                          </m:r>
+                        </m:sub>
+                      </m:sSub>
+                    </m:oMath>
+                  </m:oMathPara>
+                </a14:m>
+                <a:endParaRPr lang="en-US" dirty="0"/>
+              </a:p>
+            </p:txBody>
+          </p:sp>
+        </mc:Choice>
+        <mc:Fallback xmlns="">
+          <p:sp>
+            <p:nvSpPr>
+              <p:cNvPr id="8" name="Rectangle 7">
+                <a:extLst>
+                  <a:ext uri="{FF2B5EF4-FFF2-40B4-BE49-F238E27FC236}">
+                    <a16:creationId xmlns:a16="http://schemas.microsoft.com/office/drawing/2014/main" id="{0684F5C3-33C3-4287-AF11-5265B86FE464}"/>
+                  </a:ext>
+                </a:extLst>
+              </p:cNvPr>
+              <p:cNvSpPr>
+                <a:spLocks noRot="1" noChangeAspect="1" noMove="1" noResize="1" noEditPoints="1" noAdjustHandles="1" noChangeArrowheads="1" noChangeShapeType="1" noTextEdit="1"/>
+              </p:cNvSpPr>
+              <p:nvPr/>
+            </p:nvSpPr>
+            <p:spPr>
+              <a:xfrm>
+                <a:off x="3193480" y="762000"/>
+                <a:ext cx="2757037" cy="369332"/>
+              </a:xfrm>
+              <a:prstGeom prst="rect">
+                <a:avLst/>
+              </a:prstGeom>
+              <a:blipFill>
+                <a:blip r:embed="rId5"/>
+                <a:stretch>
+                  <a:fillRect/>
+                </a:stretch>
+              </a:blipFill>
+            </p:spPr>
+            <p:txBody>
+              <a:bodyPr/>
+              <a:lstStyle/>
+              <a:p>
+                <a:r>
+                  <a:rPr lang="en-US">
+                    <a:noFill/>
+                  </a:rPr>
+                  <a:t> </a:t>
+                </a:r>
+              </a:p>
+            </p:txBody>
+          </p:sp>
+        </mc:Fallback>
+      </mc:AlternateContent>
     </p:spTree>
     <p:extLst>
       <p:ext uri="{BB962C8B-B14F-4D97-AF65-F5344CB8AC3E}">
@@ -2860,6 +4471,275 @@
   <p:clrMapOvr>
     <a:masterClrMapping/>
   </p:clrMapOvr>
+  <p:timing>
+    <p:tnLst>
+      <p:par>
+        <p:cTn id="1" dur="indefinite" restart="never" nodeType="tmRoot">
+          <p:childTnLst>
+            <p:seq concurrent="1" nextAc="seek">
+              <p:cTn id="2" dur="indefinite" nodeType="mainSeq">
+                <p:childTnLst>
+                  <p:par>
+                    <p:cTn id="3" fill="hold">
+                      <p:stCondLst>
+                        <p:cond delay="indefinite"/>
+                      </p:stCondLst>
+                      <p:childTnLst>
+                        <p:par>
+                          <p:cTn id="4" fill="hold">
+                            <p:stCondLst>
+                              <p:cond delay="0"/>
+                            </p:stCondLst>
+                            <p:childTnLst>
+                              <p:par>
+                                <p:cTn id="5" presetID="10" presetClass="entr" presetSubtype="0" fill="hold" nodeType="clickEffect">
+                                  <p:stCondLst>
+                                    <p:cond delay="0"/>
+                                  </p:stCondLst>
+                                  <p:childTnLst>
+                                    <p:set>
+                                      <p:cBhvr>
+                                        <p:cTn id="6" dur="1" fill="hold">
+                                          <p:stCondLst>
+                                            <p:cond delay="0"/>
+                                          </p:stCondLst>
+                                        </p:cTn>
+                                        <p:tgtEl>
+                                          <p:spTgt spid="6"/>
+                                        </p:tgtEl>
+                                        <p:attrNameLst>
+                                          <p:attrName>style.visibility</p:attrName>
+                                        </p:attrNameLst>
+                                      </p:cBhvr>
+                                      <p:to>
+                                        <p:strVal val="visible"/>
+                                      </p:to>
+                                    </p:set>
+                                    <p:animEffect transition="in" filter="fade">
+                                      <p:cBhvr>
+                                        <p:cTn id="7" dur="500"/>
+                                        <p:tgtEl>
+                                          <p:spTgt spid="6"/>
+                                        </p:tgtEl>
+                                      </p:cBhvr>
+                                    </p:animEffect>
+                                  </p:childTnLst>
+                                </p:cTn>
+                              </p:par>
+                            </p:childTnLst>
+                          </p:cTn>
+                        </p:par>
+                      </p:childTnLst>
+                    </p:cTn>
+                  </p:par>
+                  <p:par>
+                    <p:cTn id="8" fill="hold">
+                      <p:stCondLst>
+                        <p:cond delay="indefinite"/>
+                      </p:stCondLst>
+                      <p:childTnLst>
+                        <p:par>
+                          <p:cTn id="9" fill="hold">
+                            <p:stCondLst>
+                              <p:cond delay="0"/>
+                            </p:stCondLst>
+                            <p:childTnLst>
+                              <p:par>
+                                <p:cTn id="10" presetID="10" presetClass="entr" presetSubtype="0" fill="hold" grpId="0" nodeType="clickEffect">
+                                  <p:stCondLst>
+                                    <p:cond delay="0"/>
+                                  </p:stCondLst>
+                                  <p:childTnLst>
+                                    <p:set>
+                                      <p:cBhvr>
+                                        <p:cTn id="11" dur="1" fill="hold">
+                                          <p:stCondLst>
+                                            <p:cond delay="0"/>
+                                          </p:stCondLst>
+                                        </p:cTn>
+                                        <p:tgtEl>
+                                          <p:spTgt spid="7">
+                                            <p:txEl>
+                                              <p:pRg st="0" end="0"/>
+                                            </p:txEl>
+                                          </p:spTgt>
+                                        </p:tgtEl>
+                                        <p:attrNameLst>
+                                          <p:attrName>style.visibility</p:attrName>
+                                        </p:attrNameLst>
+                                      </p:cBhvr>
+                                      <p:to>
+                                        <p:strVal val="visible"/>
+                                      </p:to>
+                                    </p:set>
+                                    <p:animEffect transition="in" filter="fade">
+                                      <p:cBhvr>
+                                        <p:cTn id="12" dur="500"/>
+                                        <p:tgtEl>
+                                          <p:spTgt spid="7">
+                                            <p:txEl>
+                                              <p:pRg st="0" end="0"/>
+                                            </p:txEl>
+                                          </p:spTgt>
+                                        </p:tgtEl>
+                                      </p:cBhvr>
+                                    </p:animEffect>
+                                  </p:childTnLst>
+                                </p:cTn>
+                              </p:par>
+                            </p:childTnLst>
+                          </p:cTn>
+                        </p:par>
+                      </p:childTnLst>
+                    </p:cTn>
+                  </p:par>
+                  <p:par>
+                    <p:cTn id="13" fill="hold">
+                      <p:stCondLst>
+                        <p:cond delay="indefinite"/>
+                      </p:stCondLst>
+                      <p:childTnLst>
+                        <p:par>
+                          <p:cTn id="14" fill="hold">
+                            <p:stCondLst>
+                              <p:cond delay="0"/>
+                            </p:stCondLst>
+                            <p:childTnLst>
+                              <p:par>
+                                <p:cTn id="15" presetID="10" presetClass="entr" presetSubtype="0" fill="hold" grpId="0" nodeType="clickEffect">
+                                  <p:stCondLst>
+                                    <p:cond delay="0"/>
+                                  </p:stCondLst>
+                                  <p:childTnLst>
+                                    <p:set>
+                                      <p:cBhvr>
+                                        <p:cTn id="16" dur="1" fill="hold">
+                                          <p:stCondLst>
+                                            <p:cond delay="0"/>
+                                          </p:stCondLst>
+                                        </p:cTn>
+                                        <p:tgtEl>
+                                          <p:spTgt spid="7">
+                                            <p:txEl>
+                                              <p:pRg st="1" end="1"/>
+                                            </p:txEl>
+                                          </p:spTgt>
+                                        </p:tgtEl>
+                                        <p:attrNameLst>
+                                          <p:attrName>style.visibility</p:attrName>
+                                        </p:attrNameLst>
+                                      </p:cBhvr>
+                                      <p:to>
+                                        <p:strVal val="visible"/>
+                                      </p:to>
+                                    </p:set>
+                                    <p:animEffect transition="in" filter="fade">
+                                      <p:cBhvr>
+                                        <p:cTn id="17" dur="500"/>
+                                        <p:tgtEl>
+                                          <p:spTgt spid="7">
+                                            <p:txEl>
+                                              <p:pRg st="1" end="1"/>
+                                            </p:txEl>
+                                          </p:spTgt>
+                                        </p:tgtEl>
+                                      </p:cBhvr>
+                                    </p:animEffect>
+                                  </p:childTnLst>
+                                </p:cTn>
+                              </p:par>
+                            </p:childTnLst>
+                          </p:cTn>
+                        </p:par>
+                      </p:childTnLst>
+                    </p:cTn>
+                  </p:par>
+                  <p:par>
+                    <p:cTn id="18" fill="hold">
+                      <p:stCondLst>
+                        <p:cond delay="indefinite"/>
+                      </p:stCondLst>
+                      <p:childTnLst>
+                        <p:par>
+                          <p:cTn id="19" fill="hold">
+                            <p:stCondLst>
+                              <p:cond delay="0"/>
+                            </p:stCondLst>
+                            <p:childTnLst>
+                              <p:par>
+                                <p:cTn id="20" presetID="10" presetClass="entr" presetSubtype="0" fill="hold" grpId="0" nodeType="clickEffect">
+                                  <p:stCondLst>
+                                    <p:cond delay="0"/>
+                                  </p:stCondLst>
+                                  <p:childTnLst>
+                                    <p:set>
+                                      <p:cBhvr>
+                                        <p:cTn id="21" dur="1" fill="hold">
+                                          <p:stCondLst>
+                                            <p:cond delay="0"/>
+                                          </p:stCondLst>
+                                        </p:cTn>
+                                        <p:tgtEl>
+                                          <p:spTgt spid="7">
+                                            <p:txEl>
+                                              <p:pRg st="2" end="2"/>
+                                            </p:txEl>
+                                          </p:spTgt>
+                                        </p:tgtEl>
+                                        <p:attrNameLst>
+                                          <p:attrName>style.visibility</p:attrName>
+                                        </p:attrNameLst>
+                                      </p:cBhvr>
+                                      <p:to>
+                                        <p:strVal val="visible"/>
+                                      </p:to>
+                                    </p:set>
+                                    <p:animEffect transition="in" filter="fade">
+                                      <p:cBhvr>
+                                        <p:cTn id="22" dur="500"/>
+                                        <p:tgtEl>
+                                          <p:spTgt spid="7">
+                                            <p:txEl>
+                                              <p:pRg st="2" end="2"/>
+                                            </p:txEl>
+                                          </p:spTgt>
+                                        </p:tgtEl>
+                                      </p:cBhvr>
+                                    </p:animEffect>
+                                  </p:childTnLst>
+                                </p:cTn>
+                              </p:par>
+                            </p:childTnLst>
+                          </p:cTn>
+                        </p:par>
+                      </p:childTnLst>
+                    </p:cTn>
+                  </p:par>
+                </p:childTnLst>
+              </p:cTn>
+              <p:prevCondLst>
+                <p:cond evt="onPrev" delay="0">
+                  <p:tgtEl>
+                    <p:sldTgt/>
+                  </p:tgtEl>
+                </p:cond>
+              </p:prevCondLst>
+              <p:nextCondLst>
+                <p:cond evt="onNext" delay="0">
+                  <p:tgtEl>
+                    <p:sldTgt/>
+                  </p:tgtEl>
+                </p:cond>
+              </p:nextCondLst>
+            </p:seq>
+          </p:childTnLst>
+        </p:cTn>
+      </p:par>
+    </p:tnLst>
+    <p:bldLst>
+      <p:bldP spid="7" grpId="0" build="p" bldLvl="2"/>
+    </p:bldLst>
+  </p:timing>
 </p:sld>
 </file>
 
@@ -3144,15 +5024,7 @@
             <a:pPr algn="ctr"/>
             <a:r>
               <a:rPr lang="en-US" sz="2000" dirty="0"/>
-              <a:t>Use AIC 5 to identify the top five quality models with respect to AIC for the cancelled flight data from the SWADelay.csv data set (column: </a:t>
-            </a:r>
-            <a:r>
-              <a:rPr lang="en-US" sz="2000" dirty="0" err="1"/>
-              <a:t>arr_cancelled</a:t>
-            </a:r>
-            <a:r>
-              <a:rPr lang="en-US" sz="2000" dirty="0"/>
-              <a:t>). Comment on which are AR, MA, and ARMA.</a:t>
+              <a:t>Use AIC 5 to identify the top five quality models with respect to AIC for the cancelled flight data from the SWADelay.csv data set (column: arr_cancelled). Comment on which are AR, MA, and ARMA.</a:t>
             </a:r>
           </a:p>
         </p:txBody>
@@ -3325,27 +5197,14 @@
           <a:p>
             <a:r>
               <a:rPr lang="en-US" dirty="0"/>
-              <a:t>Five Smallest Values of  </a:t>
-            </a:r>
-            <a:r>
-              <a:rPr lang="en-US" dirty="0" err="1"/>
-              <a:t>aic</a:t>
-            </a:r>
+              <a:t>Five Smallest Values of  aic </a:t>
+            </a:r>
+          </a:p>
+          <a:p>
             <a:r>
               <a:rPr lang="en-US" dirty="0"/>
-              <a:t> </a:t>
-            </a:r>
-          </a:p>
-          <a:p>
-            <a:r>
-              <a:rPr lang="en-US" dirty="0"/>
-              <a:t>      p    q        </a:t>
-            </a:r>
-            <a:r>
-              <a:rPr lang="en-US" dirty="0" err="1"/>
-              <a:t>aic</a:t>
-            </a:r>
-            <a:endParaRPr lang="en-US" dirty="0"/>
+              <a:t>      p    q        aic</a:t>
+            </a:r>
           </a:p>
           <a:p>
             <a:r>
@@ -3421,15 +5280,7 @@
           <a:p>
             <a:r>
               <a:rPr lang="en-US" sz="1600" kern="0" dirty="0"/>
-              <a:t>Here we have the top five quality models with respect to the AIC for the canceled flight data from the SWADelay.csv data set using the </a:t>
-            </a:r>
-            <a:r>
-              <a:rPr lang="en-US" sz="1600" kern="0" dirty="0" err="1"/>
-              <a:t>arr_cancelled</a:t>
-            </a:r>
-            <a:r>
-              <a:rPr lang="en-US" sz="1600" kern="0" dirty="0"/>
-              <a:t> column.</a:t>
+              <a:t>Here we have the top five quality models with respect to the AIC for the canceled flight data from the SWADelay.csv data set using the arr_cancelled column.</a:t>
             </a:r>
           </a:p>
         </p:txBody>
@@ -3584,6 +5435,1349 @@
           </a:p>
         </p:txBody>
       </p:sp>
+      <p:sp>
+        <p:nvSpPr>
+          <p:cNvPr id="5" name="TextBox 4">
+            <a:extLst>
+              <a:ext uri="{FF2B5EF4-FFF2-40B4-BE49-F238E27FC236}">
+                <a16:creationId xmlns:a16="http://schemas.microsoft.com/office/drawing/2014/main" id="{7B971223-205D-47AB-9C2E-5ECB5B89C0CA}"/>
+              </a:ext>
+            </a:extLst>
+          </p:cNvPr>
+          <p:cNvSpPr txBox="1"/>
+          <p:nvPr/>
+        </p:nvSpPr>
+        <p:spPr bwMode="auto">
+          <a:xfrm>
+            <a:off x="182217" y="4021137"/>
+            <a:ext cx="3810000" cy="685800"/>
+          </a:xfrm>
+          <a:prstGeom prst="rect">
+            <a:avLst/>
+          </a:prstGeom>
+          <a:noFill/>
+          <a:ln>
+            <a:noFill/>
+          </a:ln>
+          <a:extLst>
+            <a:ext uri="{909E8E84-426E-40DD-AFC4-6F175D3DCCD1}">
+              <a14:hiddenFill xmlns:a14="http://schemas.microsoft.com/office/drawing/2010/main">
+                <a:solidFill>
+                  <a:srgbClr val="FFFFFF"/>
+                </a:solidFill>
+              </a14:hiddenFill>
+            </a:ext>
+            <a:ext uri="{91240B29-F687-4F45-9708-019B960494DF}">
+              <a14:hiddenLine xmlns:a14="http://schemas.microsoft.com/office/drawing/2010/main" w="9525">
+                <a:solidFill>
+                  <a:srgbClr val="000000"/>
+                </a:solidFill>
+                <a:miter lim="800000"/>
+                <a:headEnd/>
+                <a:tailEnd/>
+              </a14:hiddenLine>
+            </a:ext>
+          </a:extLst>
+        </p:spPr>
+        <p:txBody>
+          <a:bodyPr wrap="square" rtlCol="0">
+            <a:noAutofit/>
+          </a:bodyPr>
+          <a:lstStyle/>
+          <a:p>
+            <a:pPr marR="0" lvl="0" algn="l" defTabSz="914400" rtl="0" eaLnBrk="1" fontAlgn="auto" latinLnBrk="0" hangingPunct="1">
+              <a:lnSpc>
+                <a:spcPct val="100000"/>
+              </a:lnSpc>
+              <a:spcBef>
+                <a:spcPts val="600"/>
+              </a:spcBef>
+              <a:spcAft>
+                <a:spcPts val="0"/>
+              </a:spcAft>
+              <a:buClrTx/>
+              <a:buSzTx/>
+              <a:tabLst/>
+              <a:defRPr/>
+            </a:pPr>
+            <a:r>
+              <a:rPr lang="en-US" dirty="0">
+                <a:solidFill>
+                  <a:prstClr val="black"/>
+                </a:solidFill>
+                <a:latin typeface="Arial" panose="020B0604020202020204" pitchFamily="34" charset="0"/>
+                <a:cs typeface="Arial" panose="020B0604020202020204" pitchFamily="34" charset="0"/>
+              </a:rPr>
+              <a:t>A</a:t>
+            </a:r>
+            <a:r>
+              <a:rPr kumimoji="0" lang="en-US" b="0" i="0" u="none" strike="noStrike" kern="1200" cap="none" spc="0" normalizeH="0" baseline="0" noProof="0" dirty="0">
+                <a:ln>
+                  <a:noFill/>
+                </a:ln>
+                <a:solidFill>
+                  <a:prstClr val="black"/>
+                </a:solidFill>
+                <a:effectLst/>
+                <a:uLnTx/>
+                <a:uFillTx/>
+                <a:latin typeface="Arial" panose="020B0604020202020204" pitchFamily="34" charset="0"/>
+                <a:cs typeface="Arial" panose="020B0604020202020204" pitchFamily="34" charset="0"/>
+              </a:rPr>
+              <a:t>n MA(</a:t>
+            </a:r>
+            <a:r>
+              <a:rPr kumimoji="0" lang="en-US" b="0" i="1" u="none" strike="noStrike" kern="1200" cap="none" spc="0" normalizeH="0" baseline="0" noProof="0" dirty="0">
+                <a:ln>
+                  <a:noFill/>
+                </a:ln>
+                <a:solidFill>
+                  <a:prstClr val="black"/>
+                </a:solidFill>
+                <a:effectLst/>
+                <a:uLnTx/>
+                <a:uFillTx/>
+                <a:latin typeface="Arial" panose="020B0604020202020204" pitchFamily="34" charset="0"/>
+                <a:cs typeface="Arial" panose="020B0604020202020204" pitchFamily="34" charset="0"/>
+              </a:rPr>
+              <a:t>q</a:t>
+            </a:r>
+            <a:r>
+              <a:rPr kumimoji="0" lang="en-US" b="0" i="0" u="none" strike="noStrike" kern="1200" cap="none" spc="0" normalizeH="0" baseline="0" noProof="0" dirty="0">
+                <a:ln>
+                  <a:noFill/>
+                </a:ln>
+                <a:solidFill>
+                  <a:prstClr val="black"/>
+                </a:solidFill>
+                <a:effectLst/>
+                <a:uLnTx/>
+                <a:uFillTx/>
+                <a:latin typeface="Arial" panose="020B0604020202020204" pitchFamily="34" charset="0"/>
+                <a:cs typeface="Arial" panose="020B0604020202020204" pitchFamily="34" charset="0"/>
+              </a:rPr>
+              <a:t>) is an ARMA</a:t>
+            </a:r>
+            <a:r>
+              <a:rPr kumimoji="0" lang="en-US" b="0" i="0" u="none" strike="noStrike" kern="1200" cap="none" spc="0" normalizeH="0" baseline="0" noProof="0" dirty="0">
+                <a:ln>
+                  <a:noFill/>
+                </a:ln>
+                <a:solidFill>
+                  <a:prstClr val="black"/>
+                </a:solidFill>
+                <a:effectLst/>
+                <a:uLnTx/>
+                <a:uFillTx/>
+                <a:latin typeface="Times New Roman" panose="02020603050405020304" pitchFamily="18" charset="0"/>
+                <a:cs typeface="Times New Roman" panose="02020603050405020304" pitchFamily="18" charset="0"/>
+              </a:rPr>
+              <a:t>(0,</a:t>
+            </a:r>
+            <a:r>
+              <a:rPr kumimoji="0" lang="en-US" b="0" i="1" u="none" strike="noStrike" kern="1200" cap="none" spc="0" normalizeH="0" baseline="0" noProof="0" dirty="0">
+                <a:ln>
+                  <a:noFill/>
+                </a:ln>
+                <a:solidFill>
+                  <a:prstClr val="black"/>
+                </a:solidFill>
+                <a:effectLst/>
+                <a:uLnTx/>
+                <a:uFillTx/>
+                <a:latin typeface="Arial" panose="020B0604020202020204" pitchFamily="34" charset="0"/>
+                <a:cs typeface="Arial" panose="020B0604020202020204" pitchFamily="34" charset="0"/>
+              </a:rPr>
+              <a:t>q</a:t>
+            </a:r>
+            <a:r>
+              <a:rPr kumimoji="0" lang="en-US" b="0" i="0" u="none" strike="noStrike" kern="1200" cap="none" spc="0" normalizeH="0" baseline="0" noProof="0" dirty="0">
+                <a:ln>
+                  <a:noFill/>
+                </a:ln>
+                <a:solidFill>
+                  <a:prstClr val="black"/>
+                </a:solidFill>
+                <a:effectLst/>
+                <a:uLnTx/>
+                <a:uFillTx/>
+                <a:latin typeface="Times New Roman" panose="02020603050405020304" pitchFamily="18" charset="0"/>
+                <a:cs typeface="Times New Roman" panose="02020603050405020304" pitchFamily="18" charset="0"/>
+              </a:rPr>
+              <a:t>) </a:t>
+            </a:r>
+            <a:r>
+              <a:rPr kumimoji="0" lang="en-US" b="0" i="0" u="none" strike="noStrike" kern="1200" cap="none" spc="0" normalizeH="0" baseline="0" noProof="0" dirty="0">
+                <a:ln>
+                  <a:noFill/>
+                </a:ln>
+                <a:solidFill>
+                  <a:prstClr val="black"/>
+                </a:solidFill>
+                <a:effectLst/>
+                <a:uLnTx/>
+                <a:uFillTx/>
+                <a:latin typeface="Arial" panose="020B0604020202020204" pitchFamily="34" charset="0"/>
+                <a:cs typeface="Arial" panose="020B0604020202020204" pitchFamily="34" charset="0"/>
+              </a:rPr>
+              <a:t>model.</a:t>
+            </a:r>
+          </a:p>
+          <a:p>
+            <a:pPr marR="0" lvl="0" algn="l" defTabSz="914400" rtl="0" eaLnBrk="1" fontAlgn="auto" latinLnBrk="0" hangingPunct="1">
+              <a:lnSpc>
+                <a:spcPct val="100000"/>
+              </a:lnSpc>
+              <a:spcBef>
+                <a:spcPts val="600"/>
+              </a:spcBef>
+              <a:spcAft>
+                <a:spcPts val="0"/>
+              </a:spcAft>
+              <a:buClrTx/>
+              <a:buSzTx/>
+              <a:tabLst/>
+              <a:defRPr/>
+            </a:pPr>
+            <a:r>
+              <a:rPr lang="en-US" dirty="0">
+                <a:solidFill>
+                  <a:prstClr val="black"/>
+                </a:solidFill>
+                <a:latin typeface="Arial" panose="020B0604020202020204" pitchFamily="34" charset="0"/>
+                <a:cs typeface="Arial" panose="020B0604020202020204" pitchFamily="34" charset="0"/>
+              </a:rPr>
+              <a:t>A</a:t>
+            </a:r>
+            <a:r>
+              <a:rPr kumimoji="0" lang="en-US" b="0" i="0" u="none" strike="noStrike" kern="1200" cap="none" spc="0" normalizeH="0" baseline="0" noProof="0" dirty="0">
+                <a:ln>
+                  <a:noFill/>
+                </a:ln>
+                <a:solidFill>
+                  <a:prstClr val="black"/>
+                </a:solidFill>
+                <a:effectLst/>
+                <a:uLnTx/>
+                <a:uFillTx/>
+                <a:latin typeface="Arial" panose="020B0604020202020204" pitchFamily="34" charset="0"/>
+                <a:cs typeface="Arial" panose="020B0604020202020204" pitchFamily="34" charset="0"/>
+              </a:rPr>
+              <a:t>n AR(</a:t>
+            </a:r>
+            <a:r>
+              <a:rPr kumimoji="0" lang="en-US" b="0" i="1" u="none" strike="noStrike" kern="1200" cap="none" spc="0" normalizeH="0" baseline="0" noProof="0" dirty="0">
+                <a:ln>
+                  <a:noFill/>
+                </a:ln>
+                <a:solidFill>
+                  <a:prstClr val="black"/>
+                </a:solidFill>
+                <a:effectLst/>
+                <a:uLnTx/>
+                <a:uFillTx/>
+                <a:latin typeface="Arial" panose="020B0604020202020204" pitchFamily="34" charset="0"/>
+                <a:cs typeface="Arial" panose="020B0604020202020204" pitchFamily="34" charset="0"/>
+              </a:rPr>
+              <a:t>p</a:t>
+            </a:r>
+            <a:r>
+              <a:rPr kumimoji="0" lang="en-US" b="0" i="0" u="none" strike="noStrike" kern="1200" cap="none" spc="0" normalizeH="0" baseline="0" noProof="0" dirty="0">
+                <a:ln>
+                  <a:noFill/>
+                </a:ln>
+                <a:solidFill>
+                  <a:prstClr val="black"/>
+                </a:solidFill>
+                <a:effectLst/>
+                <a:uLnTx/>
+                <a:uFillTx/>
+                <a:latin typeface="Arial" panose="020B0604020202020204" pitchFamily="34" charset="0"/>
+                <a:cs typeface="Arial" panose="020B0604020202020204" pitchFamily="34" charset="0"/>
+              </a:rPr>
+              <a:t>) is an ARMA</a:t>
+            </a:r>
+            <a:r>
+              <a:rPr kumimoji="0" lang="en-US" b="0" i="0" u="none" strike="noStrike" kern="1200" cap="none" spc="0" normalizeH="0" baseline="0" noProof="0" dirty="0">
+                <a:ln>
+                  <a:noFill/>
+                </a:ln>
+                <a:solidFill>
+                  <a:prstClr val="black"/>
+                </a:solidFill>
+                <a:effectLst/>
+                <a:uLnTx/>
+                <a:uFillTx/>
+                <a:latin typeface="Times New Roman" panose="02020603050405020304" pitchFamily="18" charset="0"/>
+                <a:cs typeface="Times New Roman" panose="02020603050405020304" pitchFamily="18" charset="0"/>
+              </a:rPr>
+              <a:t>(</a:t>
+            </a:r>
+            <a:r>
+              <a:rPr kumimoji="0" lang="en-US" b="0" i="1" u="none" strike="noStrike" kern="1200" cap="none" spc="0" normalizeH="0" baseline="0" noProof="0" dirty="0">
+                <a:ln>
+                  <a:noFill/>
+                </a:ln>
+                <a:solidFill>
+                  <a:prstClr val="black"/>
+                </a:solidFill>
+                <a:effectLst/>
+                <a:uLnTx/>
+                <a:uFillTx/>
+                <a:latin typeface="Arial" panose="020B0604020202020204" pitchFamily="34" charset="0"/>
+                <a:cs typeface="Arial" panose="020B0604020202020204" pitchFamily="34" charset="0"/>
+              </a:rPr>
+              <a:t>p</a:t>
+            </a:r>
+            <a:r>
+              <a:rPr kumimoji="0" lang="en-US" b="0" i="0" u="none" strike="noStrike" kern="1200" cap="none" spc="0" normalizeH="0" baseline="0" noProof="0" dirty="0">
+                <a:ln>
+                  <a:noFill/>
+                </a:ln>
+                <a:solidFill>
+                  <a:prstClr val="black"/>
+                </a:solidFill>
+                <a:effectLst/>
+                <a:uLnTx/>
+                <a:uFillTx/>
+                <a:latin typeface="Times New Roman" panose="02020603050405020304" pitchFamily="18" charset="0"/>
+                <a:cs typeface="Times New Roman" panose="02020603050405020304" pitchFamily="18" charset="0"/>
+              </a:rPr>
+              <a:t>,0)</a:t>
+            </a:r>
+            <a:r>
+              <a:rPr kumimoji="0" lang="en-US" b="0" i="0" u="none" strike="noStrike" kern="1200" cap="none" spc="0" normalizeH="0" baseline="0" noProof="0" dirty="0">
+                <a:ln>
+                  <a:noFill/>
+                </a:ln>
+                <a:solidFill>
+                  <a:prstClr val="black"/>
+                </a:solidFill>
+                <a:effectLst/>
+                <a:uLnTx/>
+                <a:uFillTx/>
+                <a:latin typeface="Arial" panose="020B0604020202020204" pitchFamily="34" charset="0"/>
+                <a:cs typeface="Arial" panose="020B0604020202020204" pitchFamily="34" charset="0"/>
+              </a:rPr>
+              <a:t> model.</a:t>
+            </a:r>
+          </a:p>
+        </p:txBody>
+      </p:sp>
+      <p:sp>
+        <p:nvSpPr>
+          <p:cNvPr id="3" name="Rectangle 2">
+            <a:extLst>
+              <a:ext uri="{FF2B5EF4-FFF2-40B4-BE49-F238E27FC236}">
+                <a16:creationId xmlns:a16="http://schemas.microsoft.com/office/drawing/2014/main" id="{A73D3E05-3D1F-4348-966D-9B18E77C8A0A}"/>
+              </a:ext>
+            </a:extLst>
+          </p:cNvPr>
+          <p:cNvSpPr/>
+          <p:nvPr/>
+        </p:nvSpPr>
+        <p:spPr>
+          <a:xfrm>
+            <a:off x="152400" y="2819400"/>
+            <a:ext cx="4648200" cy="1231106"/>
+          </a:xfrm>
+          <a:prstGeom prst="rect">
+            <a:avLst/>
+          </a:prstGeom>
+        </p:spPr>
+        <p:txBody>
+          <a:bodyPr wrap="square">
+            <a:spAutoFit/>
+          </a:bodyPr>
+          <a:lstStyle/>
+          <a:p>
+            <a:r>
+              <a:rPr lang="en-US" sz="2000" i="1" dirty="0">
+                <a:latin typeface="Symbol" panose="05050102010706020507" pitchFamily="18" charset="2"/>
+                <a:cs typeface="Arial" panose="020B0604020202020204" pitchFamily="34" charset="0"/>
+              </a:rPr>
+              <a:t>y</a:t>
+            </a:r>
+            <a:r>
+              <a:rPr lang="en-US" i="1" dirty="0">
+                <a:latin typeface="Arial" panose="020B0604020202020204" pitchFamily="34" charset="0"/>
+                <a:cs typeface="Arial" panose="020B0604020202020204" pitchFamily="34" charset="0"/>
+              </a:rPr>
+              <a:t>-</a:t>
+            </a:r>
+            <a:r>
+              <a:rPr lang="en-US" dirty="0">
+                <a:latin typeface="Arial" panose="020B0604020202020204" pitchFamily="34" charset="0"/>
+                <a:cs typeface="Arial" panose="020B0604020202020204" pitchFamily="34" charset="0"/>
+              </a:rPr>
+              <a:t>Weights </a:t>
+            </a:r>
+            <a:r>
+              <a:rPr lang="en-US" dirty="0">
+                <a:solidFill>
+                  <a:prstClr val="black"/>
+                </a:solidFill>
+                <a:latin typeface="Arial" panose="020B0604020202020204" pitchFamily="34" charset="0"/>
+                <a:cs typeface="Arial" panose="020B0604020202020204" pitchFamily="34" charset="0"/>
+              </a:rPr>
+              <a:t>are used in establishing prediction limits on forecasts</a:t>
+            </a:r>
+          </a:p>
+          <a:p>
+            <a:r>
+              <a:rPr lang="en-US" dirty="0">
+                <a:solidFill>
+                  <a:prstClr val="black"/>
+                </a:solidFill>
+                <a:latin typeface="Arial" panose="020B0604020202020204" pitchFamily="34" charset="0"/>
+                <a:cs typeface="Arial" panose="020B0604020202020204" pitchFamily="34" charset="0"/>
+              </a:rPr>
+              <a:t>calculate </a:t>
+            </a:r>
+            <a:r>
+              <a:rPr lang="en-US" i="1" dirty="0">
+                <a:solidFill>
+                  <a:prstClr val="black"/>
+                </a:solidFill>
+                <a:latin typeface="Symbol" panose="05050102010706020507" pitchFamily="18" charset="2"/>
+                <a:cs typeface="Arial" panose="020B0604020202020204" pitchFamily="34" charset="0"/>
+              </a:rPr>
+              <a:t>y</a:t>
+            </a:r>
+            <a:r>
+              <a:rPr lang="en-US" dirty="0">
+                <a:solidFill>
+                  <a:prstClr val="black"/>
+                </a:solidFill>
+                <a:latin typeface="Arial" panose="020B0604020202020204" pitchFamily="34" charset="0"/>
+                <a:cs typeface="Arial" panose="020B0604020202020204" pitchFamily="34" charset="0"/>
+              </a:rPr>
+              <a:t>-weights using </a:t>
+            </a:r>
+            <a:r>
+              <a:rPr lang="en-US" dirty="0" err="1">
+                <a:solidFill>
+                  <a:prstClr val="black"/>
+                </a:solidFill>
+                <a:latin typeface="Arial" panose="020B0604020202020204" pitchFamily="34" charset="0"/>
+                <a:cs typeface="Arial" panose="020B0604020202020204" pitchFamily="34" charset="0"/>
+              </a:rPr>
+              <a:t>tswge</a:t>
+            </a:r>
+            <a:r>
+              <a:rPr lang="en-US" dirty="0">
+                <a:solidFill>
+                  <a:prstClr val="black"/>
+                </a:solidFill>
+                <a:latin typeface="Arial" panose="020B0604020202020204" pitchFamily="34" charset="0"/>
+                <a:cs typeface="Arial" panose="020B0604020202020204" pitchFamily="34" charset="0"/>
+              </a:rPr>
+              <a:t> command</a:t>
+            </a:r>
+          </a:p>
+          <a:p>
+            <a:r>
+              <a:rPr lang="en-US" i="1" dirty="0" err="1">
+                <a:solidFill>
+                  <a:prstClr val="black"/>
+                </a:solidFill>
+                <a:latin typeface="Arial" panose="020B0604020202020204" pitchFamily="34" charset="0"/>
+                <a:cs typeface="Arial" panose="020B0604020202020204" pitchFamily="34" charset="0"/>
+              </a:rPr>
+              <a:t>psi.weights.wge</a:t>
+            </a:r>
+            <a:endParaRPr lang="en-US" i="1" dirty="0"/>
+          </a:p>
+        </p:txBody>
+      </p:sp>
+      <p:sp>
+        <p:nvSpPr>
+          <p:cNvPr id="6" name="Rectangle 5">
+            <a:extLst>
+              <a:ext uri="{FF2B5EF4-FFF2-40B4-BE49-F238E27FC236}">
+                <a16:creationId xmlns:a16="http://schemas.microsoft.com/office/drawing/2014/main" id="{314E764B-4D51-4597-B572-DB5F6C3577A9}"/>
+              </a:ext>
+            </a:extLst>
+          </p:cNvPr>
+          <p:cNvSpPr/>
+          <p:nvPr/>
+        </p:nvSpPr>
+        <p:spPr>
+          <a:xfrm>
+            <a:off x="304800" y="4830048"/>
+            <a:ext cx="8610600" cy="1323439"/>
+          </a:xfrm>
+          <a:prstGeom prst="rect">
+            <a:avLst/>
+          </a:prstGeom>
+        </p:spPr>
+        <p:txBody>
+          <a:bodyPr wrap="square">
+            <a:spAutoFit/>
+          </a:bodyPr>
+          <a:lstStyle/>
+          <a:p>
+            <a:r>
+              <a:rPr lang="en-US" sz="2000" b="1" u="sng" dirty="0">
+                <a:cs typeface="Arial" panose="020B0604020202020204" pitchFamily="34" charset="0"/>
+              </a:rPr>
+              <a:t>Question:</a:t>
+            </a:r>
+          </a:p>
+          <a:p>
+            <a:r>
+              <a:rPr lang="en-US" sz="1200" dirty="0">
+                <a:cs typeface="Arial" panose="020B0604020202020204" pitchFamily="34" charset="0"/>
+              </a:rPr>
+              <a:t>I am still having problems visualizing </a:t>
+            </a:r>
+            <a:r>
+              <a:rPr lang="en-US" sz="1200" dirty="0"/>
+              <a:t>Invertibility. I found this information: </a:t>
+            </a:r>
+            <a:r>
+              <a:rPr lang="en-US" sz="800" dirty="0"/>
+              <a:t>http://www-stat.wharton.upenn.edu/~stine/stat910/lectures/08_intro_arma.pdf</a:t>
+            </a:r>
+            <a:br>
+              <a:rPr lang="en-US" sz="1200" dirty="0"/>
+            </a:br>
+            <a:r>
+              <a:rPr lang="en-US" sz="1200" b="1" dirty="0"/>
+              <a:t>Conditions for invertible ARMA </a:t>
+            </a:r>
+            <a:r>
+              <a:rPr lang="en-US" sz="1200" dirty="0"/>
+              <a:t>Assume that the polynomials φ(B) and θ(B) have no common zeros. The process {</a:t>
+            </a:r>
+            <a:r>
+              <a:rPr lang="en-US" sz="1200" dirty="0" err="1"/>
+              <a:t>Xt</a:t>
+            </a:r>
+            <a:r>
+              <a:rPr lang="en-US" sz="1200" dirty="0"/>
+              <a:t>} is invertible if and only if the zeros of the moving average polynomial θ(B) lie outside the unit circle.</a:t>
+            </a:r>
+          </a:p>
+          <a:p>
+            <a:r>
+              <a:rPr lang="en-US" sz="1200" dirty="0">
+                <a:cs typeface="Arial" panose="020B0604020202020204" pitchFamily="34" charset="0"/>
+              </a:rPr>
+              <a:t>Would you please explain in more detail </a:t>
+            </a:r>
+            <a:r>
+              <a:rPr lang="en-US" sz="1200" dirty="0"/>
+              <a:t>Invertibility in regards to 3.2.12 in the book and will the factor tables always look the same if it  this condition is met? </a:t>
+            </a:r>
+            <a:endParaRPr lang="en-US" sz="1200" dirty="0">
+              <a:cs typeface="Arial" panose="020B0604020202020204" pitchFamily="34" charset="0"/>
+            </a:endParaRPr>
+          </a:p>
+        </p:txBody>
+      </p:sp>
+      <p:sp>
+        <p:nvSpPr>
+          <p:cNvPr id="8" name="Rectangle 7">
+            <a:extLst>
+              <a:ext uri="{FF2B5EF4-FFF2-40B4-BE49-F238E27FC236}">
+                <a16:creationId xmlns:a16="http://schemas.microsoft.com/office/drawing/2014/main" id="{9DEFE6E8-847C-497F-A9E0-B89089E72FDA}"/>
+              </a:ext>
+            </a:extLst>
+          </p:cNvPr>
+          <p:cNvSpPr/>
+          <p:nvPr/>
+        </p:nvSpPr>
+        <p:spPr>
+          <a:xfrm>
+            <a:off x="152400" y="957669"/>
+            <a:ext cx="6019800" cy="1615827"/>
+          </a:xfrm>
+          <a:prstGeom prst="rect">
+            <a:avLst/>
+          </a:prstGeom>
+        </p:spPr>
+        <p:txBody>
+          <a:bodyPr wrap="square">
+            <a:spAutoFit/>
+          </a:bodyPr>
+          <a:lstStyle/>
+          <a:p>
+            <a:pPr lvl="0">
+              <a:spcBef>
+                <a:spcPts val="600"/>
+              </a:spcBef>
+              <a:defRPr/>
+            </a:pPr>
+            <a:r>
+              <a:rPr lang="en-US" sz="1400" dirty="0">
+                <a:solidFill>
+                  <a:prstClr val="black"/>
+                </a:solidFill>
+                <a:latin typeface="Arial" panose="020B0604020202020204" pitchFamily="34" charset="0"/>
+                <a:cs typeface="Arial" panose="020B0604020202020204" pitchFamily="34" charset="0"/>
+              </a:rPr>
+              <a:t>Wording for AR models for which the characteristic equation has complex conjugate roots.</a:t>
+            </a:r>
+            <a:endParaRPr lang="en-US" sz="1400" b="1" dirty="0">
+              <a:solidFill>
+                <a:srgbClr val="0000FF"/>
+              </a:solidFill>
+              <a:latin typeface="Arial" panose="020B0604020202020204" pitchFamily="34" charset="0"/>
+              <a:cs typeface="Arial" panose="020B0604020202020204" pitchFamily="34" charset="0"/>
+            </a:endParaRPr>
+          </a:p>
+          <a:p>
+            <a:pPr marL="342900" lvl="0" indent="-342900">
+              <a:spcBef>
+                <a:spcPts val="600"/>
+              </a:spcBef>
+              <a:buFont typeface="Arial" panose="020B0604020202020204" pitchFamily="34" charset="0"/>
+              <a:buChar char="•"/>
+              <a:defRPr/>
+            </a:pPr>
+            <a:r>
+              <a:rPr lang="en-US" sz="1400" dirty="0">
+                <a:solidFill>
+                  <a:prstClr val="black"/>
+                </a:solidFill>
+                <a:latin typeface="Arial" panose="020B0604020202020204" pitchFamily="34" charset="0"/>
+                <a:cs typeface="Arial" panose="020B0604020202020204" pitchFamily="34" charset="0"/>
+              </a:rPr>
+              <a:t>The data have a pseudo-cyclic appearance.</a:t>
+            </a:r>
+          </a:p>
+          <a:p>
+            <a:pPr marL="342900" lvl="0" indent="-342900">
+              <a:spcBef>
+                <a:spcPts val="600"/>
+              </a:spcBef>
+              <a:buFont typeface="Arial" panose="020B0604020202020204" pitchFamily="34" charset="0"/>
+              <a:buChar char="•"/>
+              <a:defRPr/>
+            </a:pPr>
+            <a:r>
+              <a:rPr lang="en-US" sz="1400" dirty="0">
+                <a:solidFill>
+                  <a:prstClr val="black"/>
+                </a:solidFill>
+                <a:latin typeface="Arial" panose="020B0604020202020204" pitchFamily="34" charset="0"/>
+                <a:cs typeface="Arial" panose="020B0604020202020204" pitchFamily="34" charset="0"/>
+              </a:rPr>
+              <a:t>The autocorrelations show damped sinusoidal behavior.</a:t>
+            </a:r>
+          </a:p>
+          <a:p>
+            <a:pPr marL="342900" lvl="0" indent="-342900">
+              <a:spcBef>
+                <a:spcPts val="600"/>
+              </a:spcBef>
+              <a:buFont typeface="Arial" panose="020B0604020202020204" pitchFamily="34" charset="0"/>
+              <a:buChar char="•"/>
+              <a:defRPr/>
+            </a:pPr>
+            <a:r>
+              <a:rPr lang="en-US" sz="1400" dirty="0">
+                <a:solidFill>
+                  <a:prstClr val="black"/>
+                </a:solidFill>
+                <a:latin typeface="Arial" panose="020B0604020202020204" pitchFamily="34" charset="0"/>
+                <a:cs typeface="Arial" panose="020B0604020202020204" pitchFamily="34" charset="0"/>
+              </a:rPr>
+              <a:t>The spectral density has a peak at some </a:t>
+            </a:r>
+            <a:r>
+              <a:rPr lang="en-US" sz="1400" i="1" dirty="0">
+                <a:solidFill>
+                  <a:prstClr val="black"/>
+                </a:solidFill>
+                <a:latin typeface="Times New Roman" panose="02020603050405020304" pitchFamily="18" charset="0"/>
+                <a:cs typeface="Times New Roman" panose="02020603050405020304" pitchFamily="18" charset="0"/>
+              </a:rPr>
+              <a:t>f</a:t>
+            </a:r>
+            <a:r>
+              <a:rPr lang="en-US" sz="1400" baseline="-25000" dirty="0">
+                <a:solidFill>
+                  <a:prstClr val="black"/>
+                </a:solidFill>
+                <a:latin typeface="Times New Roman" panose="02020603050405020304" pitchFamily="18" charset="0"/>
+                <a:cs typeface="Times New Roman" panose="02020603050405020304" pitchFamily="18" charset="0"/>
+              </a:rPr>
+              <a:t>0 </a:t>
+            </a:r>
+            <a:r>
+              <a:rPr lang="en-US" sz="1400" dirty="0">
+                <a:solidFill>
+                  <a:prstClr val="black"/>
+                </a:solidFill>
+                <a:latin typeface="Arial" panose="020B0604020202020204" pitchFamily="34" charset="0"/>
+                <a:cs typeface="Arial" panose="020B0604020202020204" pitchFamily="34" charset="0"/>
+              </a:rPr>
+              <a:t>between</a:t>
+            </a:r>
+            <a:r>
+              <a:rPr lang="en-US" sz="1400" dirty="0">
+                <a:solidFill>
+                  <a:prstClr val="black"/>
+                </a:solidFill>
+                <a:latin typeface="Times New Roman" panose="02020603050405020304" pitchFamily="18" charset="0"/>
+                <a:cs typeface="Times New Roman" panose="02020603050405020304" pitchFamily="18" charset="0"/>
+              </a:rPr>
+              <a:t> </a:t>
+            </a:r>
+            <a:br>
+              <a:rPr lang="en-US" sz="1400" dirty="0">
+                <a:solidFill>
+                  <a:prstClr val="black"/>
+                </a:solidFill>
+                <a:latin typeface="Times New Roman" panose="02020603050405020304" pitchFamily="18" charset="0"/>
+                <a:cs typeface="Times New Roman" panose="02020603050405020304" pitchFamily="18" charset="0"/>
+              </a:rPr>
+            </a:br>
+            <a:r>
+              <a:rPr lang="en-US" sz="1400" dirty="0">
+                <a:solidFill>
+                  <a:prstClr val="black"/>
+                </a:solidFill>
+                <a:latin typeface="Times New Roman" panose="02020603050405020304" pitchFamily="18" charset="0"/>
+                <a:cs typeface="Times New Roman" panose="02020603050405020304" pitchFamily="18" charset="0"/>
+              </a:rPr>
+              <a:t>0 </a:t>
+            </a:r>
+            <a:r>
+              <a:rPr lang="en-US" sz="1400" dirty="0">
+                <a:solidFill>
+                  <a:prstClr val="black"/>
+                </a:solidFill>
+                <a:latin typeface="Arial" panose="020B0604020202020204" pitchFamily="34" charset="0"/>
+                <a:cs typeface="Arial" panose="020B0604020202020204" pitchFamily="34" charset="0"/>
+              </a:rPr>
+              <a:t>and</a:t>
+            </a:r>
+            <a:r>
+              <a:rPr lang="en-US" sz="1400" dirty="0">
+                <a:solidFill>
+                  <a:prstClr val="black"/>
+                </a:solidFill>
+                <a:latin typeface="Times New Roman" panose="02020603050405020304" pitchFamily="18" charset="0"/>
+                <a:cs typeface="Times New Roman" panose="02020603050405020304" pitchFamily="18" charset="0"/>
+              </a:rPr>
+              <a:t> .5 </a:t>
+            </a:r>
+            <a:r>
+              <a:rPr lang="en-US" sz="1400" dirty="0">
+                <a:solidFill>
+                  <a:prstClr val="black"/>
+                </a:solidFill>
+                <a:latin typeface="Arial" panose="020B0604020202020204" pitchFamily="34" charset="0"/>
+                <a:cs typeface="Arial" panose="020B0604020202020204" pitchFamily="34" charset="0"/>
+              </a:rPr>
+              <a:t>(at approximately </a:t>
+            </a:r>
+            <a:r>
+              <a:rPr lang="en-US" sz="1400" dirty="0">
+                <a:solidFill>
+                  <a:prstClr val="black"/>
+                </a:solidFill>
+                <a:latin typeface="Times New Roman" panose="02020603050405020304" pitchFamily="18" charset="0"/>
+                <a:cs typeface="Times New Roman" panose="02020603050405020304" pitchFamily="18" charset="0"/>
+              </a:rPr>
+              <a:t>.1 </a:t>
+            </a:r>
+            <a:r>
+              <a:rPr lang="en-US" sz="1400" dirty="0">
+                <a:solidFill>
+                  <a:prstClr val="black"/>
+                </a:solidFill>
+                <a:latin typeface="Arial" panose="020B0604020202020204" pitchFamily="34" charset="0"/>
+                <a:cs typeface="Arial" panose="020B0604020202020204" pitchFamily="34" charset="0"/>
+              </a:rPr>
+              <a:t>in this case).</a:t>
+            </a:r>
+          </a:p>
+        </p:txBody>
+      </p:sp>
+      <p:sp>
+        <p:nvSpPr>
+          <p:cNvPr id="9" name="Rectangle 8">
+            <a:extLst>
+              <a:ext uri="{FF2B5EF4-FFF2-40B4-BE49-F238E27FC236}">
+                <a16:creationId xmlns:a16="http://schemas.microsoft.com/office/drawing/2014/main" id="{9B7974A5-3645-4105-B434-82B23931B512}"/>
+              </a:ext>
+            </a:extLst>
+          </p:cNvPr>
+          <p:cNvSpPr/>
+          <p:nvPr/>
+        </p:nvSpPr>
+        <p:spPr>
+          <a:xfrm>
+            <a:off x="5181600" y="1226403"/>
+            <a:ext cx="3810000" cy="830997"/>
+          </a:xfrm>
+          <a:prstGeom prst="rect">
+            <a:avLst/>
+          </a:prstGeom>
+        </p:spPr>
+        <p:txBody>
+          <a:bodyPr wrap="square">
+            <a:spAutoFit/>
+          </a:bodyPr>
+          <a:lstStyle/>
+          <a:p>
+            <a:r>
+              <a:rPr lang="en-US" sz="1200" b="1" dirty="0"/>
+              <a:t>Akaike’s Information Criterion </a:t>
+            </a:r>
+          </a:p>
+          <a:p>
+            <a:pPr marL="171450" indent="-171450">
+              <a:buFont typeface="Arial" panose="020B0604020202020204" pitchFamily="34" charset="0"/>
+              <a:buChar char="•"/>
+            </a:pPr>
+            <a:r>
+              <a:rPr lang="en-US" sz="1200" dirty="0"/>
+              <a:t>used to evaluate and compare the quality of models</a:t>
+            </a:r>
+          </a:p>
+          <a:p>
+            <a:pPr marL="171450" indent="-171450">
+              <a:buFont typeface="Arial" panose="020B0604020202020204" pitchFamily="34" charset="0"/>
+              <a:buChar char="•"/>
+            </a:pPr>
+            <a:r>
+              <a:rPr lang="en-US" sz="1200" dirty="0"/>
+              <a:t>the model with the </a:t>
+            </a:r>
+            <a:r>
+              <a:rPr lang="en-US" sz="1200" b="1" dirty="0"/>
+              <a:t>lowest</a:t>
+            </a:r>
+            <a:r>
+              <a:rPr lang="en-US" sz="1200" dirty="0"/>
+              <a:t> AIC is thought to have the most quality</a:t>
+            </a:r>
+          </a:p>
+        </p:txBody>
+      </p:sp>
+      <p:sp>
+        <p:nvSpPr>
+          <p:cNvPr id="10" name="Rectangle 9">
+            <a:extLst>
+              <a:ext uri="{FF2B5EF4-FFF2-40B4-BE49-F238E27FC236}">
+                <a16:creationId xmlns:a16="http://schemas.microsoft.com/office/drawing/2014/main" id="{D1F775D3-10CE-4AEA-86CD-5EEF8C3C8FCB}"/>
+              </a:ext>
+            </a:extLst>
+          </p:cNvPr>
+          <p:cNvSpPr/>
+          <p:nvPr/>
+        </p:nvSpPr>
+        <p:spPr>
+          <a:xfrm>
+            <a:off x="4643231" y="3445708"/>
+            <a:ext cx="4305300" cy="1431161"/>
+          </a:xfrm>
+          <a:prstGeom prst="rect">
+            <a:avLst/>
+          </a:prstGeom>
+        </p:spPr>
+        <p:txBody>
+          <a:bodyPr wrap="square">
+            <a:spAutoFit/>
+          </a:bodyPr>
+          <a:lstStyle/>
+          <a:p>
+            <a:pPr lvl="1">
+              <a:spcBef>
+                <a:spcPts val="600"/>
+              </a:spcBef>
+              <a:defRPr/>
+            </a:pPr>
+            <a:r>
+              <a:rPr lang="en-US" sz="1200" i="1" dirty="0">
+                <a:solidFill>
+                  <a:prstClr val="black"/>
+                </a:solidFill>
+                <a:latin typeface="Symbol" pitchFamily="18" charset="2"/>
+              </a:rPr>
+              <a:t>j</a:t>
+            </a:r>
+            <a:r>
+              <a:rPr lang="en-US" sz="1200" dirty="0">
+                <a:solidFill>
+                  <a:prstClr val="black"/>
+                </a:solidFill>
+                <a:latin typeface="Symbol" pitchFamily="18" charset="2"/>
+              </a:rPr>
+              <a:t>(</a:t>
+            </a:r>
+            <a:r>
+              <a:rPr lang="en-US" sz="1200" i="1" dirty="0">
+                <a:solidFill>
+                  <a:prstClr val="black"/>
+                </a:solidFill>
+                <a:latin typeface="Times New Roman" pitchFamily="18" charset="0"/>
+              </a:rPr>
+              <a:t>B</a:t>
+            </a:r>
+            <a:r>
+              <a:rPr lang="en-US" sz="1200" dirty="0">
+                <a:solidFill>
+                  <a:prstClr val="black"/>
+                </a:solidFill>
+                <a:latin typeface="Symbol" pitchFamily="18" charset="2"/>
+              </a:rPr>
+              <a:t>)</a:t>
+            </a:r>
+            <a:r>
+              <a:rPr lang="en-US" sz="1200" i="1" dirty="0" err="1">
+                <a:solidFill>
+                  <a:prstClr val="black"/>
+                </a:solidFill>
+                <a:latin typeface="Times New Roman" pitchFamily="18" charset="0"/>
+              </a:rPr>
+              <a:t>X</a:t>
+            </a:r>
+            <a:r>
+              <a:rPr lang="en-US" sz="1200" i="1" baseline="-25000" dirty="0" err="1">
+                <a:solidFill>
+                  <a:prstClr val="black"/>
+                </a:solidFill>
+                <a:latin typeface="Times New Roman" pitchFamily="18" charset="0"/>
+              </a:rPr>
+              <a:t>t</a:t>
+            </a:r>
+            <a:r>
+              <a:rPr lang="en-US" sz="1200" dirty="0">
+                <a:solidFill>
+                  <a:prstClr val="black"/>
+                </a:solidFill>
+                <a:latin typeface="Symbol" pitchFamily="18" charset="2"/>
+              </a:rPr>
+              <a:t> =</a:t>
+            </a:r>
+            <a:r>
+              <a:rPr lang="en-US" sz="1200" dirty="0">
+                <a:solidFill>
+                  <a:prstClr val="black"/>
+                </a:solidFill>
+              </a:rPr>
+              <a:t> </a:t>
+            </a:r>
+            <a:r>
+              <a:rPr lang="en-US" sz="1200" i="1" dirty="0">
+                <a:solidFill>
+                  <a:prstClr val="black"/>
+                </a:solidFill>
+                <a:latin typeface="Symbol" pitchFamily="18" charset="2"/>
+              </a:rPr>
+              <a:t>q</a:t>
+            </a:r>
+            <a:r>
+              <a:rPr lang="en-US" sz="1200" dirty="0">
+                <a:solidFill>
+                  <a:prstClr val="black"/>
+                </a:solidFill>
+                <a:latin typeface="Symbol" pitchFamily="18" charset="2"/>
+              </a:rPr>
+              <a:t>(</a:t>
+            </a:r>
+            <a:r>
+              <a:rPr lang="en-US" sz="1200" i="1" dirty="0">
+                <a:solidFill>
+                  <a:prstClr val="black"/>
+                </a:solidFill>
+                <a:latin typeface="Times New Roman" pitchFamily="18" charset="0"/>
+              </a:rPr>
+              <a:t>B</a:t>
+            </a:r>
+            <a:r>
+              <a:rPr lang="en-US" sz="1200" dirty="0">
+                <a:solidFill>
+                  <a:prstClr val="black"/>
+                </a:solidFill>
+                <a:latin typeface="Symbol" pitchFamily="18" charset="2"/>
+              </a:rPr>
+              <a:t>)</a:t>
+            </a:r>
+            <a:r>
+              <a:rPr lang="en-US" sz="1200" i="1" dirty="0">
+                <a:solidFill>
+                  <a:prstClr val="black"/>
+                </a:solidFill>
+                <a:latin typeface="Times New Roman" pitchFamily="18" charset="0"/>
+              </a:rPr>
+              <a:t>a</a:t>
+            </a:r>
+            <a:r>
+              <a:rPr lang="en-US" sz="1200" i="1" baseline="-25000" dirty="0">
+                <a:solidFill>
+                  <a:prstClr val="black"/>
+                </a:solidFill>
+                <a:latin typeface="Times New Roman" pitchFamily="18" charset="0"/>
+              </a:rPr>
+              <a:t>t</a:t>
+            </a:r>
+            <a:r>
+              <a:rPr lang="en-US" sz="1200" dirty="0">
+                <a:solidFill>
+                  <a:prstClr val="black"/>
+                </a:solidFill>
+              </a:rPr>
+              <a:t> </a:t>
+            </a:r>
+            <a:r>
+              <a:rPr lang="en-US" sz="1200" dirty="0">
+                <a:solidFill>
+                  <a:prstClr val="black"/>
+                </a:solidFill>
+                <a:latin typeface="Arial" panose="020B0604020202020204" pitchFamily="34" charset="0"/>
+                <a:cs typeface="Arial" panose="020B0604020202020204" pitchFamily="34" charset="0"/>
+              </a:rPr>
+              <a:t>is </a:t>
+            </a:r>
+            <a:r>
+              <a:rPr lang="en-US" sz="1200" b="1" dirty="0">
+                <a:solidFill>
+                  <a:srgbClr val="FF0000"/>
+                </a:solidFill>
+                <a:latin typeface="Arial" panose="020B0604020202020204" pitchFamily="34" charset="0"/>
+                <a:cs typeface="Arial" panose="020B0604020202020204" pitchFamily="34" charset="0"/>
+              </a:rPr>
+              <a:t>a stationary and invertible </a:t>
+            </a:r>
+            <a:br>
+              <a:rPr lang="en-US" sz="1200" dirty="0">
+                <a:solidFill>
+                  <a:prstClr val="black"/>
+                </a:solidFill>
+              </a:rPr>
+            </a:br>
+            <a:r>
+              <a:rPr lang="en-US" sz="1200" dirty="0">
+                <a:solidFill>
+                  <a:prstClr val="black"/>
+                </a:solidFill>
+              </a:rPr>
+              <a:t>ARMA(</a:t>
+            </a:r>
+            <a:r>
+              <a:rPr lang="en-US" sz="1200" i="1" dirty="0" err="1">
+                <a:solidFill>
+                  <a:prstClr val="black"/>
+                </a:solidFill>
+                <a:latin typeface="Times New Roman" pitchFamily="18" charset="0"/>
+                <a:cs typeface="Times New Roman" pitchFamily="18" charset="0"/>
+              </a:rPr>
+              <a:t>p,q</a:t>
+            </a:r>
+            <a:r>
+              <a:rPr lang="en-US" sz="1200" dirty="0">
+                <a:solidFill>
+                  <a:prstClr val="black"/>
+                </a:solidFill>
+              </a:rPr>
+              <a:t>) </a:t>
+            </a:r>
+            <a:r>
+              <a:rPr lang="en-US" sz="1200" dirty="0">
+                <a:solidFill>
+                  <a:prstClr val="black"/>
+                </a:solidFill>
+                <a:latin typeface="Arial" panose="020B0604020202020204" pitchFamily="34" charset="0"/>
+                <a:cs typeface="Arial" panose="020B0604020202020204" pitchFamily="34" charset="0"/>
+              </a:rPr>
+              <a:t>process </a:t>
+            </a:r>
+            <a:r>
+              <a:rPr lang="en-US" sz="1200" dirty="0" err="1">
+                <a:solidFill>
+                  <a:prstClr val="black"/>
+                </a:solidFill>
+                <a:latin typeface="Arial" panose="020B0604020202020204" pitchFamily="34" charset="0"/>
+                <a:cs typeface="Arial" panose="020B0604020202020204" pitchFamily="34" charset="0"/>
+              </a:rPr>
+              <a:t>iff</a:t>
+            </a:r>
+            <a:r>
+              <a:rPr lang="en-US" sz="1200" dirty="0">
+                <a:solidFill>
+                  <a:prstClr val="black"/>
+                </a:solidFill>
+                <a:latin typeface="Arial" panose="020B0604020202020204" pitchFamily="34" charset="0"/>
+                <a:cs typeface="Arial" panose="020B0604020202020204" pitchFamily="34" charset="0"/>
+              </a:rPr>
+              <a:t>:</a:t>
+            </a:r>
+          </a:p>
+          <a:p>
+            <a:pPr marL="971550" lvl="1" indent="-514350">
+              <a:spcBef>
+                <a:spcPts val="600"/>
+              </a:spcBef>
+              <a:buFont typeface="+mj-lt"/>
+              <a:buAutoNum type="romanLcPeriod"/>
+              <a:defRPr/>
+            </a:pPr>
+            <a:r>
+              <a:rPr lang="en-US" sz="1200" dirty="0">
+                <a:solidFill>
+                  <a:prstClr val="black"/>
+                </a:solidFill>
+                <a:latin typeface="Arial" panose="020B0604020202020204" pitchFamily="34" charset="0"/>
+                <a:cs typeface="Arial" panose="020B0604020202020204" pitchFamily="34" charset="0"/>
+              </a:rPr>
+              <a:t>Roots of </a:t>
+            </a:r>
+            <a:r>
+              <a:rPr lang="en-US" sz="1200" i="1" dirty="0">
+                <a:solidFill>
+                  <a:prstClr val="black"/>
+                </a:solidFill>
+                <a:latin typeface="Symbol" pitchFamily="18" charset="2"/>
+              </a:rPr>
+              <a:t>j</a:t>
+            </a:r>
+            <a:r>
+              <a:rPr lang="en-US" sz="1200" dirty="0">
+                <a:solidFill>
+                  <a:prstClr val="black"/>
+                </a:solidFill>
+                <a:latin typeface="Symbol" pitchFamily="18" charset="2"/>
+              </a:rPr>
+              <a:t>(</a:t>
+            </a:r>
+            <a:r>
+              <a:rPr lang="en-US" sz="1200" i="1" dirty="0">
+                <a:solidFill>
+                  <a:prstClr val="black"/>
+                </a:solidFill>
+                <a:latin typeface="Times New Roman" pitchFamily="18" charset="0"/>
+              </a:rPr>
+              <a:t>z</a:t>
+            </a:r>
+            <a:r>
+              <a:rPr lang="en-US" sz="1200" dirty="0">
+                <a:solidFill>
+                  <a:prstClr val="black"/>
+                </a:solidFill>
+                <a:latin typeface="Symbol" pitchFamily="18" charset="2"/>
+              </a:rPr>
+              <a:t>) = 0</a:t>
+            </a:r>
+            <a:r>
+              <a:rPr lang="en-US" sz="1200" dirty="0">
+                <a:solidFill>
+                  <a:prstClr val="black"/>
+                </a:solidFill>
+              </a:rPr>
+              <a:t> </a:t>
+            </a:r>
+            <a:r>
+              <a:rPr lang="en-US" sz="1200" dirty="0">
+                <a:solidFill>
+                  <a:prstClr val="black"/>
+                </a:solidFill>
+                <a:latin typeface="Arial" panose="020B0604020202020204" pitchFamily="34" charset="0"/>
+                <a:cs typeface="Arial" panose="020B0604020202020204" pitchFamily="34" charset="0"/>
+              </a:rPr>
+              <a:t>are all outside the unit circle </a:t>
+            </a:r>
+          </a:p>
+          <a:p>
+            <a:pPr marL="971550" lvl="1" indent="-514350">
+              <a:spcBef>
+                <a:spcPts val="600"/>
+              </a:spcBef>
+              <a:buFont typeface="+mj-lt"/>
+              <a:buAutoNum type="romanLcPeriod"/>
+              <a:defRPr/>
+            </a:pPr>
+            <a:r>
+              <a:rPr lang="en-US" sz="1200" dirty="0">
+                <a:solidFill>
+                  <a:prstClr val="black"/>
+                </a:solidFill>
+                <a:latin typeface="Arial" panose="020B0604020202020204" pitchFamily="34" charset="0"/>
+                <a:cs typeface="Arial" panose="020B0604020202020204" pitchFamily="34" charset="0"/>
+              </a:rPr>
+              <a:t>Roots of</a:t>
+            </a:r>
+            <a:r>
+              <a:rPr lang="en-US" sz="1200" dirty="0">
+                <a:solidFill>
+                  <a:prstClr val="black"/>
+                </a:solidFill>
+              </a:rPr>
+              <a:t> </a:t>
+            </a:r>
+            <a:r>
+              <a:rPr lang="en-US" sz="1200" i="1" dirty="0">
+                <a:solidFill>
+                  <a:prstClr val="black"/>
+                </a:solidFill>
+                <a:latin typeface="Symbol" pitchFamily="18" charset="2"/>
+                <a:sym typeface="Symbol"/>
+              </a:rPr>
+              <a:t></a:t>
+            </a:r>
+            <a:r>
+              <a:rPr lang="en-US" sz="1200" dirty="0">
+                <a:solidFill>
+                  <a:prstClr val="black"/>
+                </a:solidFill>
+                <a:latin typeface="Symbol" pitchFamily="18" charset="2"/>
+              </a:rPr>
+              <a:t>(</a:t>
+            </a:r>
+            <a:r>
+              <a:rPr lang="en-US" sz="1200" i="1" dirty="0">
+                <a:solidFill>
+                  <a:prstClr val="black"/>
+                </a:solidFill>
+                <a:latin typeface="Times New Roman" pitchFamily="18" charset="0"/>
+              </a:rPr>
+              <a:t>z</a:t>
+            </a:r>
+            <a:r>
+              <a:rPr lang="en-US" sz="1200" dirty="0">
+                <a:solidFill>
+                  <a:prstClr val="black"/>
+                </a:solidFill>
+                <a:latin typeface="Symbol" pitchFamily="18" charset="2"/>
+              </a:rPr>
+              <a:t>) = 0</a:t>
+            </a:r>
+            <a:r>
+              <a:rPr lang="en-US" sz="1200" dirty="0">
+                <a:solidFill>
+                  <a:prstClr val="black"/>
+                </a:solidFill>
+              </a:rPr>
+              <a:t> </a:t>
+            </a:r>
+            <a:r>
+              <a:rPr lang="en-US" sz="1200" dirty="0">
+                <a:solidFill>
+                  <a:prstClr val="black"/>
+                </a:solidFill>
+                <a:latin typeface="Arial" panose="020B0604020202020204" pitchFamily="34" charset="0"/>
+                <a:cs typeface="Arial" panose="020B0604020202020204" pitchFamily="34" charset="0"/>
+              </a:rPr>
+              <a:t>are all outside the unit circle</a:t>
+            </a:r>
+          </a:p>
+          <a:p>
+            <a:pPr lvl="1">
+              <a:spcBef>
+                <a:spcPts val="600"/>
+              </a:spcBef>
+              <a:defRPr/>
+            </a:pPr>
+            <a:r>
+              <a:rPr lang="en-US" sz="1200" b="1" dirty="0">
+                <a:latin typeface="Arial" panose="020B0604020202020204" pitchFamily="34" charset="0"/>
+                <a:cs typeface="Arial" panose="020B0604020202020204" pitchFamily="34" charset="0"/>
+              </a:rPr>
+              <a:t>Note: </a:t>
+            </a:r>
+            <a:r>
+              <a:rPr lang="en-US" sz="1200" dirty="0">
+                <a:solidFill>
+                  <a:prstClr val="black"/>
+                </a:solidFill>
+                <a:latin typeface="Arial" panose="020B0604020202020204" pitchFamily="34" charset="0"/>
+                <a:cs typeface="Arial" panose="020B0604020202020204" pitchFamily="34" charset="0"/>
+              </a:rPr>
+              <a:t>In order to refer to a process as “ARMA,” we will require it to be </a:t>
+            </a:r>
+            <a:r>
+              <a:rPr lang="en-US" sz="1200" b="1" dirty="0">
+                <a:solidFill>
+                  <a:srgbClr val="FF0000"/>
+                </a:solidFill>
+                <a:latin typeface="Arial" panose="020B0604020202020204" pitchFamily="34" charset="0"/>
+                <a:cs typeface="Arial" panose="020B0604020202020204" pitchFamily="34" charset="0"/>
+              </a:rPr>
+              <a:t>stationary and invertible</a:t>
+            </a:r>
+            <a:r>
+              <a:rPr lang="en-US" sz="1200" dirty="0">
+                <a:solidFill>
+                  <a:prstClr val="black"/>
+                </a:solidFill>
+                <a:latin typeface="Arial" panose="020B0604020202020204" pitchFamily="34" charset="0"/>
+                <a:cs typeface="Arial" panose="020B0604020202020204" pitchFamily="34" charset="0"/>
+              </a:rPr>
+              <a:t>.</a:t>
+            </a:r>
+          </a:p>
+        </p:txBody>
+      </p:sp>
+      <p:sp>
+        <p:nvSpPr>
+          <p:cNvPr id="11" name="Rectangle 10">
+            <a:extLst>
+              <a:ext uri="{FF2B5EF4-FFF2-40B4-BE49-F238E27FC236}">
+                <a16:creationId xmlns:a16="http://schemas.microsoft.com/office/drawing/2014/main" id="{2138419E-0F3E-4D7D-B870-015FBF57223D}"/>
+              </a:ext>
+            </a:extLst>
+          </p:cNvPr>
+          <p:cNvSpPr/>
+          <p:nvPr/>
+        </p:nvSpPr>
+        <p:spPr>
+          <a:xfrm>
+            <a:off x="5867400" y="2057400"/>
+            <a:ext cx="1341521" cy="369332"/>
+          </a:xfrm>
+          <a:prstGeom prst="rect">
+            <a:avLst/>
+          </a:prstGeom>
+        </p:spPr>
+        <p:txBody>
+          <a:bodyPr wrap="none">
+            <a:spAutoFit/>
+          </a:bodyPr>
+          <a:lstStyle/>
+          <a:p>
+            <a:r>
+              <a:rPr lang="en-US" dirty="0"/>
+              <a:t>Cancellation</a:t>
+            </a:r>
+          </a:p>
+        </p:txBody>
+      </p:sp>
+      <p:pic>
+        <p:nvPicPr>
+          <p:cNvPr id="12" name="Picture 11">
+            <a:extLst>
+              <a:ext uri="{FF2B5EF4-FFF2-40B4-BE49-F238E27FC236}">
+                <a16:creationId xmlns:a16="http://schemas.microsoft.com/office/drawing/2014/main" id="{E06D432B-D907-4AAB-BD07-ABA0548E93D1}"/>
+              </a:ext>
+            </a:extLst>
+          </p:cNvPr>
+          <p:cNvPicPr>
+            <a:picLocks noChangeAspect="1"/>
+          </p:cNvPicPr>
+          <p:nvPr/>
+        </p:nvPicPr>
+        <p:blipFill>
+          <a:blip r:embed="rId3"/>
+          <a:stretch>
+            <a:fillRect/>
+          </a:stretch>
+        </p:blipFill>
+        <p:spPr>
+          <a:xfrm>
+            <a:off x="4926338" y="2438400"/>
+            <a:ext cx="3739085" cy="766870"/>
+          </a:xfrm>
+          <a:prstGeom prst="rect">
+            <a:avLst/>
+          </a:prstGeom>
+        </p:spPr>
+      </p:pic>
     </p:spTree>
     <p:extLst>
       <p:ext uri="{BB962C8B-B14F-4D97-AF65-F5344CB8AC3E}">
@@ -3594,6 +6788,161 @@
   <p:clrMapOvr>
     <a:masterClrMapping/>
   </p:clrMapOvr>
+  <p:timing>
+    <p:tnLst>
+      <p:par>
+        <p:cTn id="1" dur="indefinite" restart="never" nodeType="tmRoot">
+          <p:childTnLst>
+            <p:seq concurrent="1" nextAc="seek">
+              <p:cTn id="2" dur="indefinite" nodeType="mainSeq">
+                <p:childTnLst>
+                  <p:par>
+                    <p:cTn id="3" fill="hold">
+                      <p:stCondLst>
+                        <p:cond delay="indefinite"/>
+                      </p:stCondLst>
+                      <p:childTnLst>
+                        <p:par>
+                          <p:cTn id="4" fill="hold">
+                            <p:stCondLst>
+                              <p:cond delay="0"/>
+                            </p:stCondLst>
+                            <p:childTnLst>
+                              <p:par>
+                                <p:cTn id="5" presetID="10" presetClass="entr" presetSubtype="0" fill="hold" grpId="0" nodeType="clickEffect">
+                                  <p:stCondLst>
+                                    <p:cond delay="0"/>
+                                  </p:stCondLst>
+                                  <p:childTnLst>
+                                    <p:set>
+                                      <p:cBhvr>
+                                        <p:cTn id="6" dur="1" fill="hold">
+                                          <p:stCondLst>
+                                            <p:cond delay="0"/>
+                                          </p:stCondLst>
+                                        </p:cTn>
+                                        <p:tgtEl>
+                                          <p:spTgt spid="5">
+                                            <p:txEl>
+                                              <p:pRg st="0" end="0"/>
+                                            </p:txEl>
+                                          </p:spTgt>
+                                        </p:tgtEl>
+                                        <p:attrNameLst>
+                                          <p:attrName>style.visibility</p:attrName>
+                                        </p:attrNameLst>
+                                      </p:cBhvr>
+                                      <p:to>
+                                        <p:strVal val="visible"/>
+                                      </p:to>
+                                    </p:set>
+                                    <p:animEffect transition="in" filter="fade">
+                                      <p:cBhvr>
+                                        <p:cTn id="7" dur="500"/>
+                                        <p:tgtEl>
+                                          <p:spTgt spid="5">
+                                            <p:txEl>
+                                              <p:pRg st="0" end="0"/>
+                                            </p:txEl>
+                                          </p:spTgt>
+                                        </p:tgtEl>
+                                      </p:cBhvr>
+                                    </p:animEffect>
+                                  </p:childTnLst>
+                                </p:cTn>
+                              </p:par>
+                            </p:childTnLst>
+                          </p:cTn>
+                        </p:par>
+                      </p:childTnLst>
+                    </p:cTn>
+                  </p:par>
+                  <p:par>
+                    <p:cTn id="8" fill="hold">
+                      <p:stCondLst>
+                        <p:cond delay="indefinite"/>
+                      </p:stCondLst>
+                      <p:childTnLst>
+                        <p:par>
+                          <p:cTn id="9" fill="hold">
+                            <p:stCondLst>
+                              <p:cond delay="0"/>
+                            </p:stCondLst>
+                            <p:childTnLst>
+                              <p:par>
+                                <p:cTn id="10" presetID="10" presetClass="entr" presetSubtype="0" fill="hold" grpId="0" nodeType="clickEffect">
+                                  <p:stCondLst>
+                                    <p:cond delay="0"/>
+                                  </p:stCondLst>
+                                  <p:childTnLst>
+                                    <p:set>
+                                      <p:cBhvr>
+                                        <p:cTn id="11" dur="1" fill="hold">
+                                          <p:stCondLst>
+                                            <p:cond delay="0"/>
+                                          </p:stCondLst>
+                                        </p:cTn>
+                                        <p:tgtEl>
+                                          <p:spTgt spid="5">
+                                            <p:txEl>
+                                              <p:pRg st="1" end="1"/>
+                                            </p:txEl>
+                                          </p:spTgt>
+                                        </p:tgtEl>
+                                        <p:attrNameLst>
+                                          <p:attrName>style.visibility</p:attrName>
+                                        </p:attrNameLst>
+                                      </p:cBhvr>
+                                      <p:to>
+                                        <p:strVal val="visible"/>
+                                      </p:to>
+                                    </p:set>
+                                    <p:animEffect transition="in" filter="fade">
+                                      <p:cBhvr>
+                                        <p:cTn id="12" dur="500"/>
+                                        <p:tgtEl>
+                                          <p:spTgt spid="5">
+                                            <p:txEl>
+                                              <p:pRg st="1" end="1"/>
+                                            </p:txEl>
+                                          </p:spTgt>
+                                        </p:tgtEl>
+                                      </p:cBhvr>
+                                    </p:animEffect>
+                                  </p:childTnLst>
+                                </p:cTn>
+                              </p:par>
+                            </p:childTnLst>
+                          </p:cTn>
+                        </p:par>
+                      </p:childTnLst>
+                    </p:cTn>
+                  </p:par>
+                </p:childTnLst>
+              </p:cTn>
+              <p:prevCondLst>
+                <p:cond evt="onPrev" delay="0">
+                  <p:tgtEl>
+                    <p:sldTgt/>
+                  </p:tgtEl>
+                </p:cond>
+              </p:prevCondLst>
+              <p:nextCondLst>
+                <p:cond evt="onNext" delay="0">
+                  <p:tgtEl>
+                    <p:sldTgt/>
+                  </p:tgtEl>
+                </p:cond>
+              </p:nextCondLst>
+            </p:seq>
+          </p:childTnLst>
+        </p:cTn>
+      </p:par>
+    </p:tnLst>
+    <p:bldLst>
+      <p:bldP spid="5" grpId="0" build="p"/>
+    </p:bldLst>
+  </p:timing>
 </p:sld>
 </file>
 

</xml_diff>